<commit_message>
items ppt & package lock for version 03
</commit_message>
<xml_diff>
--- a/experiments/05_sentence_selection/images/items.pptx
+++ b/experiments/05_sentence_selection/images/items.pptx
@@ -593,6 +593,1266 @@
     <p:extLst>
       <p:ext uri="{BB962C8B-B14F-4D97-AF65-F5344CB8AC3E}">
         <p14:creationId xmlns:p14="http://schemas.microsoft.com/office/powerpoint/2010/main" val="4207210078"/>
+      </p:ext>
+    </p:extLst>
+  </p:cSld>
+  <p:clrMapOvr>
+    <a:masterClrMapping/>
+  </p:clrMapOvr>
+</p:notes>
+</file>
+
+<file path=ppt/notesSlides/notesSlide10.xml><?xml version="1.0" encoding="utf-8"?>
+<p:notes xmlns:a="http://schemas.openxmlformats.org/drawingml/2006/main" xmlns:r="http://schemas.openxmlformats.org/officeDocument/2006/relationships" xmlns:p="http://schemas.openxmlformats.org/presentationml/2006/main">
+  <p:cSld>
+    <p:spTree>
+      <p:nvGrpSpPr>
+        <p:cNvPr id="1" name=""/>
+        <p:cNvGrpSpPr/>
+        <p:nvPr/>
+      </p:nvGrpSpPr>
+      <p:grpSpPr>
+        <a:xfrm>
+          <a:off x="0" y="0"/>
+          <a:ext cx="0" cy="0"/>
+          <a:chOff x="0" y="0"/>
+          <a:chExt cx="0" cy="0"/>
+        </a:xfrm>
+      </p:grpSpPr>
+      <p:sp>
+        <p:nvSpPr>
+          <p:cNvPr id="2" name="Slide Image Placeholder 1"/>
+          <p:cNvSpPr>
+            <a:spLocks noGrp="1" noRot="1" noChangeAspect="1"/>
+          </p:cNvSpPr>
+          <p:nvPr>
+            <p:ph type="sldImg"/>
+          </p:nvPr>
+        </p:nvSpPr>
+        <p:spPr/>
+      </p:sp>
+      <p:sp>
+        <p:nvSpPr>
+          <p:cNvPr id="3" name="Notes Placeholder 2"/>
+          <p:cNvSpPr>
+            <a:spLocks noGrp="1"/>
+          </p:cNvSpPr>
+          <p:nvPr>
+            <p:ph type="body" idx="1"/>
+          </p:nvPr>
+        </p:nvSpPr>
+        <p:spPr/>
+        <p:txBody>
+          <a:bodyPr/>
+          <a:lstStyle/>
+          <a:p>
+            <a:endParaRPr lang="de-DE"/>
+          </a:p>
+        </p:txBody>
+      </p:sp>
+      <p:sp>
+        <p:nvSpPr>
+          <p:cNvPr id="4" name="Slide Number Placeholder 3"/>
+          <p:cNvSpPr>
+            <a:spLocks noGrp="1"/>
+          </p:cNvSpPr>
+          <p:nvPr>
+            <p:ph type="sldNum" sz="quarter" idx="5"/>
+          </p:nvPr>
+        </p:nvSpPr>
+        <p:spPr/>
+        <p:txBody>
+          <a:bodyPr/>
+          <a:lstStyle/>
+          <a:p>
+            <a:fld id="{48EA92E9-48F7-5345-AFBD-FA4269ABE060}" type="slidenum">
+              <a:rPr lang="de-DE" smtClean="0"/>
+              <a:t>13</a:t>
+            </a:fld>
+            <a:endParaRPr lang="de-DE"/>
+          </a:p>
+        </p:txBody>
+      </p:sp>
+    </p:spTree>
+    <p:extLst>
+      <p:ext uri="{BB962C8B-B14F-4D97-AF65-F5344CB8AC3E}">
+        <p14:creationId xmlns:p14="http://schemas.microsoft.com/office/powerpoint/2010/main" val="1147087701"/>
+      </p:ext>
+    </p:extLst>
+  </p:cSld>
+  <p:clrMapOvr>
+    <a:masterClrMapping/>
+  </p:clrMapOvr>
+</p:notes>
+</file>
+
+<file path=ppt/notesSlides/notesSlide11.xml><?xml version="1.0" encoding="utf-8"?>
+<p:notes xmlns:a="http://schemas.openxmlformats.org/drawingml/2006/main" xmlns:r="http://schemas.openxmlformats.org/officeDocument/2006/relationships" xmlns:p="http://schemas.openxmlformats.org/presentationml/2006/main">
+  <p:cSld>
+    <p:spTree>
+      <p:nvGrpSpPr>
+        <p:cNvPr id="1" name=""/>
+        <p:cNvGrpSpPr/>
+        <p:nvPr/>
+      </p:nvGrpSpPr>
+      <p:grpSpPr>
+        <a:xfrm>
+          <a:off x="0" y="0"/>
+          <a:ext cx="0" cy="0"/>
+          <a:chOff x="0" y="0"/>
+          <a:chExt cx="0" cy="0"/>
+        </a:xfrm>
+      </p:grpSpPr>
+      <p:sp>
+        <p:nvSpPr>
+          <p:cNvPr id="2" name="Slide Image Placeholder 1"/>
+          <p:cNvSpPr>
+            <a:spLocks noGrp="1" noRot="1" noChangeAspect="1"/>
+          </p:cNvSpPr>
+          <p:nvPr>
+            <p:ph type="sldImg"/>
+          </p:nvPr>
+        </p:nvSpPr>
+        <p:spPr/>
+      </p:sp>
+      <p:sp>
+        <p:nvSpPr>
+          <p:cNvPr id="3" name="Notes Placeholder 2"/>
+          <p:cNvSpPr>
+            <a:spLocks noGrp="1"/>
+          </p:cNvSpPr>
+          <p:nvPr>
+            <p:ph type="body" idx="1"/>
+          </p:nvPr>
+        </p:nvSpPr>
+        <p:spPr/>
+        <p:txBody>
+          <a:bodyPr/>
+          <a:lstStyle/>
+          <a:p>
+            <a:endParaRPr lang="de-DE"/>
+          </a:p>
+        </p:txBody>
+      </p:sp>
+      <p:sp>
+        <p:nvSpPr>
+          <p:cNvPr id="4" name="Slide Number Placeholder 3"/>
+          <p:cNvSpPr>
+            <a:spLocks noGrp="1"/>
+          </p:cNvSpPr>
+          <p:nvPr>
+            <p:ph type="sldNum" sz="quarter" idx="5"/>
+          </p:nvPr>
+        </p:nvSpPr>
+        <p:spPr/>
+        <p:txBody>
+          <a:bodyPr/>
+          <a:lstStyle/>
+          <a:p>
+            <a:fld id="{48EA92E9-48F7-5345-AFBD-FA4269ABE060}" type="slidenum">
+              <a:rPr lang="de-DE" smtClean="0"/>
+              <a:t>14</a:t>
+            </a:fld>
+            <a:endParaRPr lang="de-DE"/>
+          </a:p>
+        </p:txBody>
+      </p:sp>
+    </p:spTree>
+    <p:extLst>
+      <p:ext uri="{BB962C8B-B14F-4D97-AF65-F5344CB8AC3E}">
+        <p14:creationId xmlns:p14="http://schemas.microsoft.com/office/powerpoint/2010/main" val="1853034014"/>
+      </p:ext>
+    </p:extLst>
+  </p:cSld>
+  <p:clrMapOvr>
+    <a:masterClrMapping/>
+  </p:clrMapOvr>
+</p:notes>
+</file>
+
+<file path=ppt/notesSlides/notesSlide12.xml><?xml version="1.0" encoding="utf-8"?>
+<p:notes xmlns:a="http://schemas.openxmlformats.org/drawingml/2006/main" xmlns:r="http://schemas.openxmlformats.org/officeDocument/2006/relationships" xmlns:p="http://schemas.openxmlformats.org/presentationml/2006/main">
+  <p:cSld>
+    <p:spTree>
+      <p:nvGrpSpPr>
+        <p:cNvPr id="1" name=""/>
+        <p:cNvGrpSpPr/>
+        <p:nvPr/>
+      </p:nvGrpSpPr>
+      <p:grpSpPr>
+        <a:xfrm>
+          <a:off x="0" y="0"/>
+          <a:ext cx="0" cy="0"/>
+          <a:chOff x="0" y="0"/>
+          <a:chExt cx="0" cy="0"/>
+        </a:xfrm>
+      </p:grpSpPr>
+      <p:sp>
+        <p:nvSpPr>
+          <p:cNvPr id="2" name="Slide Image Placeholder 1"/>
+          <p:cNvSpPr>
+            <a:spLocks noGrp="1" noRot="1" noChangeAspect="1"/>
+          </p:cNvSpPr>
+          <p:nvPr>
+            <p:ph type="sldImg"/>
+          </p:nvPr>
+        </p:nvSpPr>
+        <p:spPr/>
+      </p:sp>
+      <p:sp>
+        <p:nvSpPr>
+          <p:cNvPr id="3" name="Notes Placeholder 2"/>
+          <p:cNvSpPr>
+            <a:spLocks noGrp="1"/>
+          </p:cNvSpPr>
+          <p:nvPr>
+            <p:ph type="body" idx="1"/>
+          </p:nvPr>
+        </p:nvSpPr>
+        <p:spPr/>
+        <p:txBody>
+          <a:bodyPr/>
+          <a:lstStyle/>
+          <a:p>
+            <a:endParaRPr lang="de-DE"/>
+          </a:p>
+        </p:txBody>
+      </p:sp>
+      <p:sp>
+        <p:nvSpPr>
+          <p:cNvPr id="4" name="Slide Number Placeholder 3"/>
+          <p:cNvSpPr>
+            <a:spLocks noGrp="1"/>
+          </p:cNvSpPr>
+          <p:nvPr>
+            <p:ph type="sldNum" sz="quarter" idx="5"/>
+          </p:nvPr>
+        </p:nvSpPr>
+        <p:spPr/>
+        <p:txBody>
+          <a:bodyPr/>
+          <a:lstStyle/>
+          <a:p>
+            <a:fld id="{48EA92E9-48F7-5345-AFBD-FA4269ABE060}" type="slidenum">
+              <a:rPr lang="de-DE" smtClean="0"/>
+              <a:t>15</a:t>
+            </a:fld>
+            <a:endParaRPr lang="de-DE"/>
+          </a:p>
+        </p:txBody>
+      </p:sp>
+    </p:spTree>
+    <p:extLst>
+      <p:ext uri="{BB962C8B-B14F-4D97-AF65-F5344CB8AC3E}">
+        <p14:creationId xmlns:p14="http://schemas.microsoft.com/office/powerpoint/2010/main" val="364868009"/>
+      </p:ext>
+    </p:extLst>
+  </p:cSld>
+  <p:clrMapOvr>
+    <a:masterClrMapping/>
+  </p:clrMapOvr>
+</p:notes>
+</file>
+
+<file path=ppt/notesSlides/notesSlide13.xml><?xml version="1.0" encoding="utf-8"?>
+<p:notes xmlns:a="http://schemas.openxmlformats.org/drawingml/2006/main" xmlns:r="http://schemas.openxmlformats.org/officeDocument/2006/relationships" xmlns:p="http://schemas.openxmlformats.org/presentationml/2006/main">
+  <p:cSld>
+    <p:spTree>
+      <p:nvGrpSpPr>
+        <p:cNvPr id="1" name=""/>
+        <p:cNvGrpSpPr/>
+        <p:nvPr/>
+      </p:nvGrpSpPr>
+      <p:grpSpPr>
+        <a:xfrm>
+          <a:off x="0" y="0"/>
+          <a:ext cx="0" cy="0"/>
+          <a:chOff x="0" y="0"/>
+          <a:chExt cx="0" cy="0"/>
+        </a:xfrm>
+      </p:grpSpPr>
+      <p:sp>
+        <p:nvSpPr>
+          <p:cNvPr id="2" name="Slide Image Placeholder 1"/>
+          <p:cNvSpPr>
+            <a:spLocks noGrp="1" noRot="1" noChangeAspect="1"/>
+          </p:cNvSpPr>
+          <p:nvPr>
+            <p:ph type="sldImg"/>
+          </p:nvPr>
+        </p:nvSpPr>
+        <p:spPr/>
+      </p:sp>
+      <p:sp>
+        <p:nvSpPr>
+          <p:cNvPr id="3" name="Notes Placeholder 2"/>
+          <p:cNvSpPr>
+            <a:spLocks noGrp="1"/>
+          </p:cNvSpPr>
+          <p:nvPr>
+            <p:ph type="body" idx="1"/>
+          </p:nvPr>
+        </p:nvSpPr>
+        <p:spPr/>
+        <p:txBody>
+          <a:bodyPr/>
+          <a:lstStyle/>
+          <a:p>
+            <a:endParaRPr lang="de-DE"/>
+          </a:p>
+        </p:txBody>
+      </p:sp>
+      <p:sp>
+        <p:nvSpPr>
+          <p:cNvPr id="4" name="Slide Number Placeholder 3"/>
+          <p:cNvSpPr>
+            <a:spLocks noGrp="1"/>
+          </p:cNvSpPr>
+          <p:nvPr>
+            <p:ph type="sldNum" sz="quarter" idx="5"/>
+          </p:nvPr>
+        </p:nvSpPr>
+        <p:spPr/>
+        <p:txBody>
+          <a:bodyPr/>
+          <a:lstStyle/>
+          <a:p>
+            <a:fld id="{48EA92E9-48F7-5345-AFBD-FA4269ABE060}" type="slidenum">
+              <a:rPr lang="de-DE" smtClean="0"/>
+              <a:t>16</a:t>
+            </a:fld>
+            <a:endParaRPr lang="de-DE"/>
+          </a:p>
+        </p:txBody>
+      </p:sp>
+    </p:spTree>
+    <p:extLst>
+      <p:ext uri="{BB962C8B-B14F-4D97-AF65-F5344CB8AC3E}">
+        <p14:creationId xmlns:p14="http://schemas.microsoft.com/office/powerpoint/2010/main" val="2177413093"/>
+      </p:ext>
+    </p:extLst>
+  </p:cSld>
+  <p:clrMapOvr>
+    <a:masterClrMapping/>
+  </p:clrMapOvr>
+</p:notes>
+</file>
+
+<file path=ppt/notesSlides/notesSlide14.xml><?xml version="1.0" encoding="utf-8"?>
+<p:notes xmlns:a="http://schemas.openxmlformats.org/drawingml/2006/main" xmlns:r="http://schemas.openxmlformats.org/officeDocument/2006/relationships" xmlns:p="http://schemas.openxmlformats.org/presentationml/2006/main">
+  <p:cSld>
+    <p:spTree>
+      <p:nvGrpSpPr>
+        <p:cNvPr id="1" name=""/>
+        <p:cNvGrpSpPr/>
+        <p:nvPr/>
+      </p:nvGrpSpPr>
+      <p:grpSpPr>
+        <a:xfrm>
+          <a:off x="0" y="0"/>
+          <a:ext cx="0" cy="0"/>
+          <a:chOff x="0" y="0"/>
+          <a:chExt cx="0" cy="0"/>
+        </a:xfrm>
+      </p:grpSpPr>
+      <p:sp>
+        <p:nvSpPr>
+          <p:cNvPr id="2" name="Slide Image Placeholder 1"/>
+          <p:cNvSpPr>
+            <a:spLocks noGrp="1" noRot="1" noChangeAspect="1"/>
+          </p:cNvSpPr>
+          <p:nvPr>
+            <p:ph type="sldImg"/>
+          </p:nvPr>
+        </p:nvSpPr>
+        <p:spPr/>
+      </p:sp>
+      <p:sp>
+        <p:nvSpPr>
+          <p:cNvPr id="3" name="Notes Placeholder 2"/>
+          <p:cNvSpPr>
+            <a:spLocks noGrp="1"/>
+          </p:cNvSpPr>
+          <p:nvPr>
+            <p:ph type="body" idx="1"/>
+          </p:nvPr>
+        </p:nvSpPr>
+        <p:spPr/>
+        <p:txBody>
+          <a:bodyPr/>
+          <a:lstStyle/>
+          <a:p>
+            <a:endParaRPr lang="de-DE"/>
+          </a:p>
+        </p:txBody>
+      </p:sp>
+      <p:sp>
+        <p:nvSpPr>
+          <p:cNvPr id="4" name="Slide Number Placeholder 3"/>
+          <p:cNvSpPr>
+            <a:spLocks noGrp="1"/>
+          </p:cNvSpPr>
+          <p:nvPr>
+            <p:ph type="sldNum" sz="quarter" idx="5"/>
+          </p:nvPr>
+        </p:nvSpPr>
+        <p:spPr/>
+        <p:txBody>
+          <a:bodyPr/>
+          <a:lstStyle/>
+          <a:p>
+            <a:fld id="{48EA92E9-48F7-5345-AFBD-FA4269ABE060}" type="slidenum">
+              <a:rPr lang="de-DE" smtClean="0"/>
+              <a:t>17</a:t>
+            </a:fld>
+            <a:endParaRPr lang="de-DE"/>
+          </a:p>
+        </p:txBody>
+      </p:sp>
+    </p:spTree>
+    <p:extLst>
+      <p:ext uri="{BB962C8B-B14F-4D97-AF65-F5344CB8AC3E}">
+        <p14:creationId xmlns:p14="http://schemas.microsoft.com/office/powerpoint/2010/main" val="534995420"/>
+      </p:ext>
+    </p:extLst>
+  </p:cSld>
+  <p:clrMapOvr>
+    <a:masterClrMapping/>
+  </p:clrMapOvr>
+</p:notes>
+</file>
+
+<file path=ppt/notesSlides/notesSlide15.xml><?xml version="1.0" encoding="utf-8"?>
+<p:notes xmlns:a="http://schemas.openxmlformats.org/drawingml/2006/main" xmlns:r="http://schemas.openxmlformats.org/officeDocument/2006/relationships" xmlns:p="http://schemas.openxmlformats.org/presentationml/2006/main">
+  <p:cSld>
+    <p:spTree>
+      <p:nvGrpSpPr>
+        <p:cNvPr id="1" name=""/>
+        <p:cNvGrpSpPr/>
+        <p:nvPr/>
+      </p:nvGrpSpPr>
+      <p:grpSpPr>
+        <a:xfrm>
+          <a:off x="0" y="0"/>
+          <a:ext cx="0" cy="0"/>
+          <a:chOff x="0" y="0"/>
+          <a:chExt cx="0" cy="0"/>
+        </a:xfrm>
+      </p:grpSpPr>
+      <p:sp>
+        <p:nvSpPr>
+          <p:cNvPr id="2" name="Slide Image Placeholder 1"/>
+          <p:cNvSpPr>
+            <a:spLocks noGrp="1" noRot="1" noChangeAspect="1"/>
+          </p:cNvSpPr>
+          <p:nvPr>
+            <p:ph type="sldImg"/>
+          </p:nvPr>
+        </p:nvSpPr>
+        <p:spPr/>
+      </p:sp>
+      <p:sp>
+        <p:nvSpPr>
+          <p:cNvPr id="3" name="Notes Placeholder 2"/>
+          <p:cNvSpPr>
+            <a:spLocks noGrp="1"/>
+          </p:cNvSpPr>
+          <p:nvPr>
+            <p:ph type="body" idx="1"/>
+          </p:nvPr>
+        </p:nvSpPr>
+        <p:spPr/>
+        <p:txBody>
+          <a:bodyPr/>
+          <a:lstStyle/>
+          <a:p>
+            <a:endParaRPr lang="de-DE"/>
+          </a:p>
+        </p:txBody>
+      </p:sp>
+      <p:sp>
+        <p:nvSpPr>
+          <p:cNvPr id="4" name="Slide Number Placeholder 3"/>
+          <p:cNvSpPr>
+            <a:spLocks noGrp="1"/>
+          </p:cNvSpPr>
+          <p:nvPr>
+            <p:ph type="sldNum" sz="quarter" idx="5"/>
+          </p:nvPr>
+        </p:nvSpPr>
+        <p:spPr/>
+        <p:txBody>
+          <a:bodyPr/>
+          <a:lstStyle/>
+          <a:p>
+            <a:fld id="{48EA92E9-48F7-5345-AFBD-FA4269ABE060}" type="slidenum">
+              <a:rPr lang="de-DE" smtClean="0"/>
+              <a:t>18</a:t>
+            </a:fld>
+            <a:endParaRPr lang="de-DE"/>
+          </a:p>
+        </p:txBody>
+      </p:sp>
+    </p:spTree>
+    <p:extLst>
+      <p:ext uri="{BB962C8B-B14F-4D97-AF65-F5344CB8AC3E}">
+        <p14:creationId xmlns:p14="http://schemas.microsoft.com/office/powerpoint/2010/main" val="419843562"/>
+      </p:ext>
+    </p:extLst>
+  </p:cSld>
+  <p:clrMapOvr>
+    <a:masterClrMapping/>
+  </p:clrMapOvr>
+</p:notes>
+</file>
+
+<file path=ppt/notesSlides/notesSlide16.xml><?xml version="1.0" encoding="utf-8"?>
+<p:notes xmlns:a="http://schemas.openxmlformats.org/drawingml/2006/main" xmlns:r="http://schemas.openxmlformats.org/officeDocument/2006/relationships" xmlns:p="http://schemas.openxmlformats.org/presentationml/2006/main">
+  <p:cSld>
+    <p:spTree>
+      <p:nvGrpSpPr>
+        <p:cNvPr id="1" name=""/>
+        <p:cNvGrpSpPr/>
+        <p:nvPr/>
+      </p:nvGrpSpPr>
+      <p:grpSpPr>
+        <a:xfrm>
+          <a:off x="0" y="0"/>
+          <a:ext cx="0" cy="0"/>
+          <a:chOff x="0" y="0"/>
+          <a:chExt cx="0" cy="0"/>
+        </a:xfrm>
+      </p:grpSpPr>
+      <p:sp>
+        <p:nvSpPr>
+          <p:cNvPr id="2" name="Slide Image Placeholder 1"/>
+          <p:cNvSpPr>
+            <a:spLocks noGrp="1" noRot="1" noChangeAspect="1"/>
+          </p:cNvSpPr>
+          <p:nvPr>
+            <p:ph type="sldImg"/>
+          </p:nvPr>
+        </p:nvSpPr>
+        <p:spPr/>
+      </p:sp>
+      <p:sp>
+        <p:nvSpPr>
+          <p:cNvPr id="3" name="Notes Placeholder 2"/>
+          <p:cNvSpPr>
+            <a:spLocks noGrp="1"/>
+          </p:cNvSpPr>
+          <p:nvPr>
+            <p:ph type="body" idx="1"/>
+          </p:nvPr>
+        </p:nvSpPr>
+        <p:spPr/>
+        <p:txBody>
+          <a:bodyPr/>
+          <a:lstStyle/>
+          <a:p>
+            <a:endParaRPr lang="de-DE"/>
+          </a:p>
+        </p:txBody>
+      </p:sp>
+      <p:sp>
+        <p:nvSpPr>
+          <p:cNvPr id="4" name="Slide Number Placeholder 3"/>
+          <p:cNvSpPr>
+            <a:spLocks noGrp="1"/>
+          </p:cNvSpPr>
+          <p:nvPr>
+            <p:ph type="sldNum" sz="quarter" idx="5"/>
+          </p:nvPr>
+        </p:nvSpPr>
+        <p:spPr/>
+        <p:txBody>
+          <a:bodyPr/>
+          <a:lstStyle/>
+          <a:p>
+            <a:fld id="{48EA92E9-48F7-5345-AFBD-FA4269ABE060}" type="slidenum">
+              <a:rPr lang="de-DE" smtClean="0"/>
+              <a:t>19</a:t>
+            </a:fld>
+            <a:endParaRPr lang="de-DE"/>
+          </a:p>
+        </p:txBody>
+      </p:sp>
+    </p:spTree>
+    <p:extLst>
+      <p:ext uri="{BB962C8B-B14F-4D97-AF65-F5344CB8AC3E}">
+        <p14:creationId xmlns:p14="http://schemas.microsoft.com/office/powerpoint/2010/main" val="4198600533"/>
+      </p:ext>
+    </p:extLst>
+  </p:cSld>
+  <p:clrMapOvr>
+    <a:masterClrMapping/>
+  </p:clrMapOvr>
+</p:notes>
+</file>
+
+<file path=ppt/notesSlides/notesSlide2.xml><?xml version="1.0" encoding="utf-8"?>
+<p:notes xmlns:a="http://schemas.openxmlformats.org/drawingml/2006/main" xmlns:r="http://schemas.openxmlformats.org/officeDocument/2006/relationships" xmlns:p="http://schemas.openxmlformats.org/presentationml/2006/main">
+  <p:cSld>
+    <p:spTree>
+      <p:nvGrpSpPr>
+        <p:cNvPr id="1" name=""/>
+        <p:cNvGrpSpPr/>
+        <p:nvPr/>
+      </p:nvGrpSpPr>
+      <p:grpSpPr>
+        <a:xfrm>
+          <a:off x="0" y="0"/>
+          <a:ext cx="0" cy="0"/>
+          <a:chOff x="0" y="0"/>
+          <a:chExt cx="0" cy="0"/>
+        </a:xfrm>
+      </p:grpSpPr>
+      <p:sp>
+        <p:nvSpPr>
+          <p:cNvPr id="2" name="Slide Image Placeholder 1"/>
+          <p:cNvSpPr>
+            <a:spLocks noGrp="1" noRot="1" noChangeAspect="1"/>
+          </p:cNvSpPr>
+          <p:nvPr>
+            <p:ph type="sldImg"/>
+          </p:nvPr>
+        </p:nvSpPr>
+        <p:spPr/>
+      </p:sp>
+      <p:sp>
+        <p:nvSpPr>
+          <p:cNvPr id="3" name="Notes Placeholder 2"/>
+          <p:cNvSpPr>
+            <a:spLocks noGrp="1"/>
+          </p:cNvSpPr>
+          <p:nvPr>
+            <p:ph type="body" idx="1"/>
+          </p:nvPr>
+        </p:nvSpPr>
+        <p:spPr/>
+        <p:txBody>
+          <a:bodyPr/>
+          <a:lstStyle/>
+          <a:p>
+            <a:endParaRPr lang="de-DE"/>
+          </a:p>
+        </p:txBody>
+      </p:sp>
+      <p:sp>
+        <p:nvSpPr>
+          <p:cNvPr id="4" name="Slide Number Placeholder 3"/>
+          <p:cNvSpPr>
+            <a:spLocks noGrp="1"/>
+          </p:cNvSpPr>
+          <p:nvPr>
+            <p:ph type="sldNum" sz="quarter" idx="5"/>
+          </p:nvPr>
+        </p:nvSpPr>
+        <p:spPr/>
+        <p:txBody>
+          <a:bodyPr/>
+          <a:lstStyle/>
+          <a:p>
+            <a:fld id="{48EA92E9-48F7-5345-AFBD-FA4269ABE060}" type="slidenum">
+              <a:rPr lang="de-DE" smtClean="0"/>
+              <a:t>5</a:t>
+            </a:fld>
+            <a:endParaRPr lang="de-DE"/>
+          </a:p>
+        </p:txBody>
+      </p:sp>
+    </p:spTree>
+    <p:extLst>
+      <p:ext uri="{BB962C8B-B14F-4D97-AF65-F5344CB8AC3E}">
+        <p14:creationId xmlns:p14="http://schemas.microsoft.com/office/powerpoint/2010/main" val="1537932413"/>
+      </p:ext>
+    </p:extLst>
+  </p:cSld>
+  <p:clrMapOvr>
+    <a:masterClrMapping/>
+  </p:clrMapOvr>
+</p:notes>
+</file>
+
+<file path=ppt/notesSlides/notesSlide3.xml><?xml version="1.0" encoding="utf-8"?>
+<p:notes xmlns:a="http://schemas.openxmlformats.org/drawingml/2006/main" xmlns:r="http://schemas.openxmlformats.org/officeDocument/2006/relationships" xmlns:p="http://schemas.openxmlformats.org/presentationml/2006/main">
+  <p:cSld>
+    <p:spTree>
+      <p:nvGrpSpPr>
+        <p:cNvPr id="1" name=""/>
+        <p:cNvGrpSpPr/>
+        <p:nvPr/>
+      </p:nvGrpSpPr>
+      <p:grpSpPr>
+        <a:xfrm>
+          <a:off x="0" y="0"/>
+          <a:ext cx="0" cy="0"/>
+          <a:chOff x="0" y="0"/>
+          <a:chExt cx="0" cy="0"/>
+        </a:xfrm>
+      </p:grpSpPr>
+      <p:sp>
+        <p:nvSpPr>
+          <p:cNvPr id="2" name="Slide Image Placeholder 1"/>
+          <p:cNvSpPr>
+            <a:spLocks noGrp="1" noRot="1" noChangeAspect="1"/>
+          </p:cNvSpPr>
+          <p:nvPr>
+            <p:ph type="sldImg"/>
+          </p:nvPr>
+        </p:nvSpPr>
+        <p:spPr/>
+      </p:sp>
+      <p:sp>
+        <p:nvSpPr>
+          <p:cNvPr id="3" name="Notes Placeholder 2"/>
+          <p:cNvSpPr>
+            <a:spLocks noGrp="1"/>
+          </p:cNvSpPr>
+          <p:nvPr>
+            <p:ph type="body" idx="1"/>
+          </p:nvPr>
+        </p:nvSpPr>
+        <p:spPr/>
+        <p:txBody>
+          <a:bodyPr/>
+          <a:lstStyle/>
+          <a:p>
+            <a:endParaRPr lang="de-DE"/>
+          </a:p>
+        </p:txBody>
+      </p:sp>
+      <p:sp>
+        <p:nvSpPr>
+          <p:cNvPr id="4" name="Slide Number Placeholder 3"/>
+          <p:cNvSpPr>
+            <a:spLocks noGrp="1"/>
+          </p:cNvSpPr>
+          <p:nvPr>
+            <p:ph type="sldNum" sz="quarter" idx="5"/>
+          </p:nvPr>
+        </p:nvSpPr>
+        <p:spPr/>
+        <p:txBody>
+          <a:bodyPr/>
+          <a:lstStyle/>
+          <a:p>
+            <a:fld id="{48EA92E9-48F7-5345-AFBD-FA4269ABE060}" type="slidenum">
+              <a:rPr lang="de-DE" smtClean="0"/>
+              <a:t>6</a:t>
+            </a:fld>
+            <a:endParaRPr lang="de-DE"/>
+          </a:p>
+        </p:txBody>
+      </p:sp>
+    </p:spTree>
+    <p:extLst>
+      <p:ext uri="{BB962C8B-B14F-4D97-AF65-F5344CB8AC3E}">
+        <p14:creationId xmlns:p14="http://schemas.microsoft.com/office/powerpoint/2010/main" val="2907995249"/>
+      </p:ext>
+    </p:extLst>
+  </p:cSld>
+  <p:clrMapOvr>
+    <a:masterClrMapping/>
+  </p:clrMapOvr>
+</p:notes>
+</file>
+
+<file path=ppt/notesSlides/notesSlide4.xml><?xml version="1.0" encoding="utf-8"?>
+<p:notes xmlns:a="http://schemas.openxmlformats.org/drawingml/2006/main" xmlns:r="http://schemas.openxmlformats.org/officeDocument/2006/relationships" xmlns:p="http://schemas.openxmlformats.org/presentationml/2006/main">
+  <p:cSld>
+    <p:spTree>
+      <p:nvGrpSpPr>
+        <p:cNvPr id="1" name=""/>
+        <p:cNvGrpSpPr/>
+        <p:nvPr/>
+      </p:nvGrpSpPr>
+      <p:grpSpPr>
+        <a:xfrm>
+          <a:off x="0" y="0"/>
+          <a:ext cx="0" cy="0"/>
+          <a:chOff x="0" y="0"/>
+          <a:chExt cx="0" cy="0"/>
+        </a:xfrm>
+      </p:grpSpPr>
+      <p:sp>
+        <p:nvSpPr>
+          <p:cNvPr id="2" name="Slide Image Placeholder 1"/>
+          <p:cNvSpPr>
+            <a:spLocks noGrp="1" noRot="1" noChangeAspect="1"/>
+          </p:cNvSpPr>
+          <p:nvPr>
+            <p:ph type="sldImg"/>
+          </p:nvPr>
+        </p:nvSpPr>
+        <p:spPr/>
+      </p:sp>
+      <p:sp>
+        <p:nvSpPr>
+          <p:cNvPr id="3" name="Notes Placeholder 2"/>
+          <p:cNvSpPr>
+            <a:spLocks noGrp="1"/>
+          </p:cNvSpPr>
+          <p:nvPr>
+            <p:ph type="body" idx="1"/>
+          </p:nvPr>
+        </p:nvSpPr>
+        <p:spPr/>
+        <p:txBody>
+          <a:bodyPr/>
+          <a:lstStyle/>
+          <a:p>
+            <a:endParaRPr lang="de-DE"/>
+          </a:p>
+        </p:txBody>
+      </p:sp>
+      <p:sp>
+        <p:nvSpPr>
+          <p:cNvPr id="4" name="Slide Number Placeholder 3"/>
+          <p:cNvSpPr>
+            <a:spLocks noGrp="1"/>
+          </p:cNvSpPr>
+          <p:nvPr>
+            <p:ph type="sldNum" sz="quarter" idx="5"/>
+          </p:nvPr>
+        </p:nvSpPr>
+        <p:spPr/>
+        <p:txBody>
+          <a:bodyPr/>
+          <a:lstStyle/>
+          <a:p>
+            <a:fld id="{48EA92E9-48F7-5345-AFBD-FA4269ABE060}" type="slidenum">
+              <a:rPr lang="de-DE" smtClean="0"/>
+              <a:t>7</a:t>
+            </a:fld>
+            <a:endParaRPr lang="de-DE"/>
+          </a:p>
+        </p:txBody>
+      </p:sp>
+    </p:spTree>
+    <p:extLst>
+      <p:ext uri="{BB962C8B-B14F-4D97-AF65-F5344CB8AC3E}">
+        <p14:creationId xmlns:p14="http://schemas.microsoft.com/office/powerpoint/2010/main" val="4100728039"/>
+      </p:ext>
+    </p:extLst>
+  </p:cSld>
+  <p:clrMapOvr>
+    <a:masterClrMapping/>
+  </p:clrMapOvr>
+</p:notes>
+</file>
+
+<file path=ppt/notesSlides/notesSlide5.xml><?xml version="1.0" encoding="utf-8"?>
+<p:notes xmlns:a="http://schemas.openxmlformats.org/drawingml/2006/main" xmlns:r="http://schemas.openxmlformats.org/officeDocument/2006/relationships" xmlns:p="http://schemas.openxmlformats.org/presentationml/2006/main">
+  <p:cSld>
+    <p:spTree>
+      <p:nvGrpSpPr>
+        <p:cNvPr id="1" name=""/>
+        <p:cNvGrpSpPr/>
+        <p:nvPr/>
+      </p:nvGrpSpPr>
+      <p:grpSpPr>
+        <a:xfrm>
+          <a:off x="0" y="0"/>
+          <a:ext cx="0" cy="0"/>
+          <a:chOff x="0" y="0"/>
+          <a:chExt cx="0" cy="0"/>
+        </a:xfrm>
+      </p:grpSpPr>
+      <p:sp>
+        <p:nvSpPr>
+          <p:cNvPr id="2" name="Slide Image Placeholder 1"/>
+          <p:cNvSpPr>
+            <a:spLocks noGrp="1" noRot="1" noChangeAspect="1"/>
+          </p:cNvSpPr>
+          <p:nvPr>
+            <p:ph type="sldImg"/>
+          </p:nvPr>
+        </p:nvSpPr>
+        <p:spPr/>
+      </p:sp>
+      <p:sp>
+        <p:nvSpPr>
+          <p:cNvPr id="3" name="Notes Placeholder 2"/>
+          <p:cNvSpPr>
+            <a:spLocks noGrp="1"/>
+          </p:cNvSpPr>
+          <p:nvPr>
+            <p:ph type="body" idx="1"/>
+          </p:nvPr>
+        </p:nvSpPr>
+        <p:spPr/>
+        <p:txBody>
+          <a:bodyPr/>
+          <a:lstStyle/>
+          <a:p>
+            <a:endParaRPr lang="de-DE"/>
+          </a:p>
+        </p:txBody>
+      </p:sp>
+      <p:sp>
+        <p:nvSpPr>
+          <p:cNvPr id="4" name="Slide Number Placeholder 3"/>
+          <p:cNvSpPr>
+            <a:spLocks noGrp="1"/>
+          </p:cNvSpPr>
+          <p:nvPr>
+            <p:ph type="sldNum" sz="quarter" idx="5"/>
+          </p:nvPr>
+        </p:nvSpPr>
+        <p:spPr/>
+        <p:txBody>
+          <a:bodyPr/>
+          <a:lstStyle/>
+          <a:p>
+            <a:fld id="{48EA92E9-48F7-5345-AFBD-FA4269ABE060}" type="slidenum">
+              <a:rPr lang="de-DE" smtClean="0"/>
+              <a:t>8</a:t>
+            </a:fld>
+            <a:endParaRPr lang="de-DE"/>
+          </a:p>
+        </p:txBody>
+      </p:sp>
+    </p:spTree>
+    <p:extLst>
+      <p:ext uri="{BB962C8B-B14F-4D97-AF65-F5344CB8AC3E}">
+        <p14:creationId xmlns:p14="http://schemas.microsoft.com/office/powerpoint/2010/main" val="2207429696"/>
+      </p:ext>
+    </p:extLst>
+  </p:cSld>
+  <p:clrMapOvr>
+    <a:masterClrMapping/>
+  </p:clrMapOvr>
+</p:notes>
+</file>
+
+<file path=ppt/notesSlides/notesSlide6.xml><?xml version="1.0" encoding="utf-8"?>
+<p:notes xmlns:a="http://schemas.openxmlformats.org/drawingml/2006/main" xmlns:r="http://schemas.openxmlformats.org/officeDocument/2006/relationships" xmlns:p="http://schemas.openxmlformats.org/presentationml/2006/main">
+  <p:cSld>
+    <p:spTree>
+      <p:nvGrpSpPr>
+        <p:cNvPr id="1" name=""/>
+        <p:cNvGrpSpPr/>
+        <p:nvPr/>
+      </p:nvGrpSpPr>
+      <p:grpSpPr>
+        <a:xfrm>
+          <a:off x="0" y="0"/>
+          <a:ext cx="0" cy="0"/>
+          <a:chOff x="0" y="0"/>
+          <a:chExt cx="0" cy="0"/>
+        </a:xfrm>
+      </p:grpSpPr>
+      <p:sp>
+        <p:nvSpPr>
+          <p:cNvPr id="2" name="Slide Image Placeholder 1"/>
+          <p:cNvSpPr>
+            <a:spLocks noGrp="1" noRot="1" noChangeAspect="1"/>
+          </p:cNvSpPr>
+          <p:nvPr>
+            <p:ph type="sldImg"/>
+          </p:nvPr>
+        </p:nvSpPr>
+        <p:spPr/>
+      </p:sp>
+      <p:sp>
+        <p:nvSpPr>
+          <p:cNvPr id="3" name="Notes Placeholder 2"/>
+          <p:cNvSpPr>
+            <a:spLocks noGrp="1"/>
+          </p:cNvSpPr>
+          <p:nvPr>
+            <p:ph type="body" idx="1"/>
+          </p:nvPr>
+        </p:nvSpPr>
+        <p:spPr/>
+        <p:txBody>
+          <a:bodyPr/>
+          <a:lstStyle/>
+          <a:p>
+            <a:endParaRPr lang="de-DE"/>
+          </a:p>
+        </p:txBody>
+      </p:sp>
+      <p:sp>
+        <p:nvSpPr>
+          <p:cNvPr id="4" name="Slide Number Placeholder 3"/>
+          <p:cNvSpPr>
+            <a:spLocks noGrp="1"/>
+          </p:cNvSpPr>
+          <p:nvPr>
+            <p:ph type="sldNum" sz="quarter" idx="5"/>
+          </p:nvPr>
+        </p:nvSpPr>
+        <p:spPr/>
+        <p:txBody>
+          <a:bodyPr/>
+          <a:lstStyle/>
+          <a:p>
+            <a:fld id="{48EA92E9-48F7-5345-AFBD-FA4269ABE060}" type="slidenum">
+              <a:rPr lang="de-DE" smtClean="0"/>
+              <a:t>9</a:t>
+            </a:fld>
+            <a:endParaRPr lang="de-DE"/>
+          </a:p>
+        </p:txBody>
+      </p:sp>
+    </p:spTree>
+    <p:extLst>
+      <p:ext uri="{BB962C8B-B14F-4D97-AF65-F5344CB8AC3E}">
+        <p14:creationId xmlns:p14="http://schemas.microsoft.com/office/powerpoint/2010/main" val="2751769162"/>
+      </p:ext>
+    </p:extLst>
+  </p:cSld>
+  <p:clrMapOvr>
+    <a:masterClrMapping/>
+  </p:clrMapOvr>
+</p:notes>
+</file>
+
+<file path=ppt/notesSlides/notesSlide7.xml><?xml version="1.0" encoding="utf-8"?>
+<p:notes xmlns:a="http://schemas.openxmlformats.org/drawingml/2006/main" xmlns:r="http://schemas.openxmlformats.org/officeDocument/2006/relationships" xmlns:p="http://schemas.openxmlformats.org/presentationml/2006/main">
+  <p:cSld>
+    <p:spTree>
+      <p:nvGrpSpPr>
+        <p:cNvPr id="1" name=""/>
+        <p:cNvGrpSpPr/>
+        <p:nvPr/>
+      </p:nvGrpSpPr>
+      <p:grpSpPr>
+        <a:xfrm>
+          <a:off x="0" y="0"/>
+          <a:ext cx="0" cy="0"/>
+          <a:chOff x="0" y="0"/>
+          <a:chExt cx="0" cy="0"/>
+        </a:xfrm>
+      </p:grpSpPr>
+      <p:sp>
+        <p:nvSpPr>
+          <p:cNvPr id="2" name="Slide Image Placeholder 1"/>
+          <p:cNvSpPr>
+            <a:spLocks noGrp="1" noRot="1" noChangeAspect="1"/>
+          </p:cNvSpPr>
+          <p:nvPr>
+            <p:ph type="sldImg"/>
+          </p:nvPr>
+        </p:nvSpPr>
+        <p:spPr/>
+      </p:sp>
+      <p:sp>
+        <p:nvSpPr>
+          <p:cNvPr id="3" name="Notes Placeholder 2"/>
+          <p:cNvSpPr>
+            <a:spLocks noGrp="1"/>
+          </p:cNvSpPr>
+          <p:nvPr>
+            <p:ph type="body" idx="1"/>
+          </p:nvPr>
+        </p:nvSpPr>
+        <p:spPr/>
+        <p:txBody>
+          <a:bodyPr/>
+          <a:lstStyle/>
+          <a:p>
+            <a:endParaRPr lang="de-DE"/>
+          </a:p>
+        </p:txBody>
+      </p:sp>
+      <p:sp>
+        <p:nvSpPr>
+          <p:cNvPr id="4" name="Slide Number Placeholder 3"/>
+          <p:cNvSpPr>
+            <a:spLocks noGrp="1"/>
+          </p:cNvSpPr>
+          <p:nvPr>
+            <p:ph type="sldNum" sz="quarter" idx="5"/>
+          </p:nvPr>
+        </p:nvSpPr>
+        <p:spPr/>
+        <p:txBody>
+          <a:bodyPr/>
+          <a:lstStyle/>
+          <a:p>
+            <a:fld id="{48EA92E9-48F7-5345-AFBD-FA4269ABE060}" type="slidenum">
+              <a:rPr lang="de-DE" smtClean="0"/>
+              <a:t>10</a:t>
+            </a:fld>
+            <a:endParaRPr lang="de-DE"/>
+          </a:p>
+        </p:txBody>
+      </p:sp>
+    </p:spTree>
+    <p:extLst>
+      <p:ext uri="{BB962C8B-B14F-4D97-AF65-F5344CB8AC3E}">
+        <p14:creationId xmlns:p14="http://schemas.microsoft.com/office/powerpoint/2010/main" val="3823409143"/>
+      </p:ext>
+    </p:extLst>
+  </p:cSld>
+  <p:clrMapOvr>
+    <a:masterClrMapping/>
+  </p:clrMapOvr>
+</p:notes>
+</file>
+
+<file path=ppt/notesSlides/notesSlide8.xml><?xml version="1.0" encoding="utf-8"?>
+<p:notes xmlns:a="http://schemas.openxmlformats.org/drawingml/2006/main" xmlns:r="http://schemas.openxmlformats.org/officeDocument/2006/relationships" xmlns:p="http://schemas.openxmlformats.org/presentationml/2006/main">
+  <p:cSld>
+    <p:spTree>
+      <p:nvGrpSpPr>
+        <p:cNvPr id="1" name=""/>
+        <p:cNvGrpSpPr/>
+        <p:nvPr/>
+      </p:nvGrpSpPr>
+      <p:grpSpPr>
+        <a:xfrm>
+          <a:off x="0" y="0"/>
+          <a:ext cx="0" cy="0"/>
+          <a:chOff x="0" y="0"/>
+          <a:chExt cx="0" cy="0"/>
+        </a:xfrm>
+      </p:grpSpPr>
+      <p:sp>
+        <p:nvSpPr>
+          <p:cNvPr id="2" name="Slide Image Placeholder 1"/>
+          <p:cNvSpPr>
+            <a:spLocks noGrp="1" noRot="1" noChangeAspect="1"/>
+          </p:cNvSpPr>
+          <p:nvPr>
+            <p:ph type="sldImg"/>
+          </p:nvPr>
+        </p:nvSpPr>
+        <p:spPr/>
+      </p:sp>
+      <p:sp>
+        <p:nvSpPr>
+          <p:cNvPr id="3" name="Notes Placeholder 2"/>
+          <p:cNvSpPr>
+            <a:spLocks noGrp="1"/>
+          </p:cNvSpPr>
+          <p:nvPr>
+            <p:ph type="body" idx="1"/>
+          </p:nvPr>
+        </p:nvSpPr>
+        <p:spPr/>
+        <p:txBody>
+          <a:bodyPr/>
+          <a:lstStyle/>
+          <a:p>
+            <a:endParaRPr lang="de-DE"/>
+          </a:p>
+        </p:txBody>
+      </p:sp>
+      <p:sp>
+        <p:nvSpPr>
+          <p:cNvPr id="4" name="Slide Number Placeholder 3"/>
+          <p:cNvSpPr>
+            <a:spLocks noGrp="1"/>
+          </p:cNvSpPr>
+          <p:nvPr>
+            <p:ph type="sldNum" sz="quarter" idx="5"/>
+          </p:nvPr>
+        </p:nvSpPr>
+        <p:spPr/>
+        <p:txBody>
+          <a:bodyPr/>
+          <a:lstStyle/>
+          <a:p>
+            <a:fld id="{48EA92E9-48F7-5345-AFBD-FA4269ABE060}" type="slidenum">
+              <a:rPr lang="de-DE" smtClean="0"/>
+              <a:t>11</a:t>
+            </a:fld>
+            <a:endParaRPr lang="de-DE"/>
+          </a:p>
+        </p:txBody>
+      </p:sp>
+    </p:spTree>
+    <p:extLst>
+      <p:ext uri="{BB962C8B-B14F-4D97-AF65-F5344CB8AC3E}">
+        <p14:creationId xmlns:p14="http://schemas.microsoft.com/office/powerpoint/2010/main" val="2786934979"/>
+      </p:ext>
+    </p:extLst>
+  </p:cSld>
+  <p:clrMapOvr>
+    <a:masterClrMapping/>
+  </p:clrMapOvr>
+</p:notes>
+</file>
+
+<file path=ppt/notesSlides/notesSlide9.xml><?xml version="1.0" encoding="utf-8"?>
+<p:notes xmlns:a="http://schemas.openxmlformats.org/drawingml/2006/main" xmlns:r="http://schemas.openxmlformats.org/officeDocument/2006/relationships" xmlns:p="http://schemas.openxmlformats.org/presentationml/2006/main">
+  <p:cSld>
+    <p:spTree>
+      <p:nvGrpSpPr>
+        <p:cNvPr id="1" name=""/>
+        <p:cNvGrpSpPr/>
+        <p:nvPr/>
+      </p:nvGrpSpPr>
+      <p:grpSpPr>
+        <a:xfrm>
+          <a:off x="0" y="0"/>
+          <a:ext cx="0" cy="0"/>
+          <a:chOff x="0" y="0"/>
+          <a:chExt cx="0" cy="0"/>
+        </a:xfrm>
+      </p:grpSpPr>
+      <p:sp>
+        <p:nvSpPr>
+          <p:cNvPr id="2" name="Slide Image Placeholder 1"/>
+          <p:cNvSpPr>
+            <a:spLocks noGrp="1" noRot="1" noChangeAspect="1"/>
+          </p:cNvSpPr>
+          <p:nvPr>
+            <p:ph type="sldImg"/>
+          </p:nvPr>
+        </p:nvSpPr>
+        <p:spPr/>
+      </p:sp>
+      <p:sp>
+        <p:nvSpPr>
+          <p:cNvPr id="3" name="Notes Placeholder 2"/>
+          <p:cNvSpPr>
+            <a:spLocks noGrp="1"/>
+          </p:cNvSpPr>
+          <p:nvPr>
+            <p:ph type="body" idx="1"/>
+          </p:nvPr>
+        </p:nvSpPr>
+        <p:spPr/>
+        <p:txBody>
+          <a:bodyPr/>
+          <a:lstStyle/>
+          <a:p>
+            <a:endParaRPr lang="de-DE"/>
+          </a:p>
+        </p:txBody>
+      </p:sp>
+      <p:sp>
+        <p:nvSpPr>
+          <p:cNvPr id="4" name="Slide Number Placeholder 3"/>
+          <p:cNvSpPr>
+            <a:spLocks noGrp="1"/>
+          </p:cNvSpPr>
+          <p:nvPr>
+            <p:ph type="sldNum" sz="quarter" idx="5"/>
+          </p:nvPr>
+        </p:nvSpPr>
+        <p:spPr/>
+        <p:txBody>
+          <a:bodyPr/>
+          <a:lstStyle/>
+          <a:p>
+            <a:fld id="{48EA92E9-48F7-5345-AFBD-FA4269ABE060}" type="slidenum">
+              <a:rPr lang="de-DE" smtClean="0"/>
+              <a:t>12</a:t>
+            </a:fld>
+            <a:endParaRPr lang="de-DE"/>
+          </a:p>
+        </p:txBody>
+      </p:sp>
+    </p:spTree>
+    <p:extLst>
+      <p:ext uri="{BB962C8B-B14F-4D97-AF65-F5344CB8AC3E}">
+        <p14:creationId xmlns:p14="http://schemas.microsoft.com/office/powerpoint/2010/main" val="308500635"/>
       </p:ext>
     </p:extLst>
   </p:cSld>
@@ -4541,7 +5801,7 @@
           <p:nvPr/>
         </p:nvPicPr>
         <p:blipFill>
-          <a:blip r:embed="rId2">
+          <a:blip r:embed="rId3">
             <a:duotone>
               <a:prstClr val="black"/>
               <a:srgbClr val="0099FF">
@@ -4578,7 +5838,7 @@
           <p:nvPr/>
         </p:nvPicPr>
         <p:blipFill>
-          <a:blip r:embed="rId2">
+          <a:blip r:embed="rId3">
             <a:duotone>
               <a:prstClr val="black"/>
               <a:srgbClr val="0099FF">
@@ -4615,7 +5875,7 @@
           <p:nvPr/>
         </p:nvPicPr>
         <p:blipFill>
-          <a:blip r:embed="rId2">
+          <a:blip r:embed="rId3">
             <a:duotone>
               <a:prstClr val="black"/>
               <a:srgbClr val="0099FF">
@@ -4652,7 +5912,7 @@
           <p:nvPr/>
         </p:nvPicPr>
         <p:blipFill>
-          <a:blip r:embed="rId2">
+          <a:blip r:embed="rId3">
             <a:duotone>
               <a:prstClr val="black"/>
               <a:srgbClr val="0099FF">
@@ -4689,7 +5949,7 @@
           <p:nvPr/>
         </p:nvPicPr>
         <p:blipFill>
-          <a:blip r:embed="rId2">
+          <a:blip r:embed="rId3">
             <a:duotone>
               <a:prstClr val="black"/>
               <a:srgbClr val="0099FF">
@@ -4726,7 +5986,7 @@
           <p:nvPr/>
         </p:nvPicPr>
         <p:blipFill>
-          <a:blip r:embed="rId2">
+          <a:blip r:embed="rId3">
             <a:duotone>
               <a:prstClr val="black"/>
               <a:srgbClr val="0099FF">
@@ -4763,7 +6023,7 @@
           <p:nvPr/>
         </p:nvPicPr>
         <p:blipFill>
-          <a:blip r:embed="rId2">
+          <a:blip r:embed="rId3">
             <a:duotone>
               <a:prstClr val="black"/>
               <a:srgbClr val="0099FF">
@@ -4800,7 +6060,7 @@
           <p:nvPr/>
         </p:nvPicPr>
         <p:blipFill>
-          <a:blip r:embed="rId2">
+          <a:blip r:embed="rId3">
             <a:duotone>
               <a:prstClr val="black"/>
               <a:srgbClr val="00FF00">
@@ -4837,7 +6097,7 @@
           <p:nvPr/>
         </p:nvPicPr>
         <p:blipFill>
-          <a:blip r:embed="rId2">
+          <a:blip r:embed="rId3">
             <a:duotone>
               <a:prstClr val="black"/>
               <a:srgbClr val="0099FF">
@@ -4874,7 +6134,7 @@
           <p:nvPr/>
         </p:nvPicPr>
         <p:blipFill>
-          <a:blip r:embed="rId2">
+          <a:blip r:embed="rId3">
             <a:duotone>
               <a:prstClr val="black"/>
               <a:srgbClr val="00FF00">
@@ -4911,7 +6171,7 @@
           <p:nvPr/>
         </p:nvPicPr>
         <p:blipFill>
-          <a:blip r:embed="rId2">
+          <a:blip r:embed="rId3">
             <a:duotone>
               <a:prstClr val="black"/>
               <a:srgbClr val="0099FF">
@@ -4948,7 +6208,7 @@
           <p:nvPr/>
         </p:nvPicPr>
         <p:blipFill>
-          <a:blip r:embed="rId2">
+          <a:blip r:embed="rId3">
             <a:duotone>
               <a:prstClr val="black"/>
               <a:srgbClr val="0099FF">
@@ -4985,7 +6245,7 @@
           <p:nvPr/>
         </p:nvPicPr>
         <p:blipFill>
-          <a:blip r:embed="rId2">
+          <a:blip r:embed="rId3">
             <a:duotone>
               <a:prstClr val="black"/>
               <a:srgbClr val="0099FF">
@@ -5022,7 +6282,7 @@
           <p:nvPr/>
         </p:nvPicPr>
         <p:blipFill>
-          <a:blip r:embed="rId2">
+          <a:blip r:embed="rId3">
             <a:duotone>
               <a:prstClr val="black"/>
               <a:srgbClr val="0099FF">
@@ -5059,7 +6319,7 @@
           <p:nvPr/>
         </p:nvPicPr>
         <p:blipFill>
-          <a:blip r:embed="rId2">
+          <a:blip r:embed="rId3">
             <a:duotone>
               <a:prstClr val="black"/>
               <a:srgbClr val="0099FF">
@@ -5096,7 +6356,7 @@
           <p:nvPr/>
         </p:nvPicPr>
         <p:blipFill>
-          <a:blip r:embed="rId2">
+          <a:blip r:embed="rId3">
             <a:duotone>
               <a:prstClr val="black"/>
               <a:srgbClr val="0099FF">
@@ -5133,7 +6393,7 @@
           <p:nvPr/>
         </p:nvPicPr>
         <p:blipFill>
-          <a:blip r:embed="rId3">
+          <a:blip r:embed="rId4">
             <a:duotone>
               <a:prstClr val="black"/>
               <a:srgbClr val="0099FF">
@@ -5170,7 +6430,7 @@
           <p:nvPr/>
         </p:nvPicPr>
         <p:blipFill>
-          <a:blip r:embed="rId3">
+          <a:blip r:embed="rId4">
             <a:duotone>
               <a:prstClr val="black"/>
               <a:srgbClr val="0099FF">
@@ -5399,7 +6659,7 @@
           <p:nvPr/>
         </p:nvPicPr>
         <p:blipFill>
-          <a:blip r:embed="rId2" cstate="print">
+          <a:blip r:embed="rId3" cstate="print">
             <a:duotone>
               <a:prstClr val="black"/>
               <a:srgbClr val="FF99CC">
@@ -5436,7 +6696,7 @@
           <p:nvPr/>
         </p:nvPicPr>
         <p:blipFill>
-          <a:blip r:embed="rId2" cstate="print">
+          <a:blip r:embed="rId3" cstate="print">
             <a:duotone>
               <a:prstClr val="black"/>
               <a:srgbClr val="FF99CC">
@@ -5473,7 +6733,7 @@
           <p:nvPr/>
         </p:nvPicPr>
         <p:blipFill>
-          <a:blip r:embed="rId2" cstate="print">
+          <a:blip r:embed="rId3" cstate="print">
             <a:duotone>
               <a:prstClr val="black"/>
               <a:srgbClr val="FF99CC">
@@ -5510,7 +6770,7 @@
           <p:nvPr/>
         </p:nvPicPr>
         <p:blipFill>
-          <a:blip r:embed="rId3" cstate="print">
+          <a:blip r:embed="rId4" cstate="print">
             <a:duotone>
               <a:prstClr val="black"/>
               <a:srgbClr val="FF99CC">
@@ -5547,7 +6807,7 @@
           <p:nvPr/>
         </p:nvPicPr>
         <p:blipFill>
-          <a:blip r:embed="rId3" cstate="print">
+          <a:blip r:embed="rId4" cstate="print">
             <a:duotone>
               <a:prstClr val="black"/>
               <a:srgbClr val="FF99CC">
@@ -5584,7 +6844,7 @@
           <p:nvPr/>
         </p:nvPicPr>
         <p:blipFill>
-          <a:blip r:embed="rId3" cstate="print">
+          <a:blip r:embed="rId4" cstate="print">
             <a:duotone>
               <a:prstClr val="black"/>
               <a:srgbClr val="0099FF">
@@ -5621,7 +6881,7 @@
           <p:nvPr/>
         </p:nvPicPr>
         <p:blipFill>
-          <a:blip r:embed="rId3" cstate="print">
+          <a:blip r:embed="rId4" cstate="print">
             <a:duotone>
               <a:prstClr val="black"/>
               <a:srgbClr val="0099FF">
@@ -5658,7 +6918,7 @@
           <p:nvPr/>
         </p:nvPicPr>
         <p:blipFill>
-          <a:blip r:embed="rId3" cstate="print">
+          <a:blip r:embed="rId4" cstate="print">
             <a:duotone>
               <a:prstClr val="black"/>
               <a:srgbClr val="FF99CC">
@@ -5695,7 +6955,7 @@
           <p:nvPr/>
         </p:nvPicPr>
         <p:blipFill>
-          <a:blip r:embed="rId3" cstate="print">
+          <a:blip r:embed="rId4" cstate="print">
             <a:duotone>
               <a:prstClr val="black"/>
               <a:srgbClr val="FF99CC">
@@ -5732,7 +6992,7 @@
           <p:nvPr/>
         </p:nvPicPr>
         <p:blipFill>
-          <a:blip r:embed="rId3" cstate="print">
+          <a:blip r:embed="rId4" cstate="print">
             <a:duotone>
               <a:prstClr val="black"/>
               <a:srgbClr val="0099FF">
@@ -5769,7 +7029,7 @@
           <p:nvPr/>
         </p:nvPicPr>
         <p:blipFill>
-          <a:blip r:embed="rId3" cstate="print">
+          <a:blip r:embed="rId4" cstate="print">
             <a:duotone>
               <a:prstClr val="black"/>
               <a:srgbClr val="FF99CC">
@@ -5806,7 +7066,7 @@
           <p:nvPr/>
         </p:nvPicPr>
         <p:blipFill>
-          <a:blip r:embed="rId3" cstate="print">
+          <a:blip r:embed="rId4" cstate="print">
             <a:duotone>
               <a:prstClr val="black"/>
               <a:srgbClr val="FF99CC">
@@ -5843,7 +7103,7 @@
           <p:nvPr/>
         </p:nvPicPr>
         <p:blipFill>
-          <a:blip r:embed="rId3" cstate="print">
+          <a:blip r:embed="rId4" cstate="print">
             <a:duotone>
               <a:prstClr val="black"/>
               <a:srgbClr val="FF99CC">
@@ -5880,7 +7140,7 @@
           <p:nvPr/>
         </p:nvPicPr>
         <p:blipFill>
-          <a:blip r:embed="rId3" cstate="print">
+          <a:blip r:embed="rId4" cstate="print">
             <a:duotone>
               <a:prstClr val="black"/>
               <a:srgbClr val="FF99CC">
@@ -5917,7 +7177,7 @@
           <p:nvPr/>
         </p:nvPicPr>
         <p:blipFill>
-          <a:blip r:embed="rId3" cstate="print">
+          <a:blip r:embed="rId4" cstate="print">
             <a:duotone>
               <a:prstClr val="black"/>
               <a:srgbClr val="FF99CC">
@@ -5954,7 +7214,7 @@
           <p:nvPr/>
         </p:nvPicPr>
         <p:blipFill>
-          <a:blip r:embed="rId3" cstate="print">
+          <a:blip r:embed="rId4" cstate="print">
             <a:duotone>
               <a:prstClr val="black"/>
               <a:srgbClr val="FF99CC">
@@ -5991,7 +7251,7 @@
           <p:nvPr/>
         </p:nvPicPr>
         <p:blipFill>
-          <a:blip r:embed="rId3" cstate="print">
+          <a:blip r:embed="rId4" cstate="print">
             <a:duotone>
               <a:prstClr val="black"/>
               <a:srgbClr val="FF99CC">
@@ -6028,7 +7288,7 @@
           <p:nvPr/>
         </p:nvPicPr>
         <p:blipFill>
-          <a:blip r:embed="rId3" cstate="print">
+          <a:blip r:embed="rId4" cstate="print">
             <a:duotone>
               <a:prstClr val="black"/>
               <a:srgbClr val="FF99CC">
@@ -6257,7 +7517,7 @@
           <p:nvPr/>
         </p:nvPicPr>
         <p:blipFill>
-          <a:blip r:embed="rId2">
+          <a:blip r:embed="rId3">
             <a:duotone>
               <a:prstClr val="black"/>
               <a:srgbClr val="0099FF">
@@ -6294,7 +7554,7 @@
           <p:nvPr/>
         </p:nvPicPr>
         <p:blipFill>
-          <a:blip r:embed="rId2">
+          <a:blip r:embed="rId3">
             <a:duotone>
               <a:prstClr val="black"/>
               <a:srgbClr val="0099FF">
@@ -6331,7 +7591,7 @@
           <p:nvPr/>
         </p:nvPicPr>
         <p:blipFill>
-          <a:blip r:embed="rId2">
+          <a:blip r:embed="rId3">
             <a:duotone>
               <a:prstClr val="black"/>
               <a:srgbClr val="0099FF">
@@ -6368,7 +7628,7 @@
           <p:nvPr/>
         </p:nvPicPr>
         <p:blipFill>
-          <a:blip r:embed="rId2">
+          <a:blip r:embed="rId3">
             <a:duotone>
               <a:prstClr val="black"/>
               <a:srgbClr val="0099FF">
@@ -6405,7 +7665,7 @@
           <p:nvPr/>
         </p:nvPicPr>
         <p:blipFill>
-          <a:blip r:embed="rId2">
+          <a:blip r:embed="rId3">
             <a:duotone>
               <a:prstClr val="black"/>
               <a:srgbClr val="0099FF">
@@ -6442,7 +7702,7 @@
           <p:nvPr/>
         </p:nvPicPr>
         <p:blipFill>
-          <a:blip r:embed="rId2">
+          <a:blip r:embed="rId3">
             <a:duotone>
               <a:prstClr val="black"/>
               <a:srgbClr val="0099FF">
@@ -6479,7 +7739,7 @@
           <p:nvPr/>
         </p:nvPicPr>
         <p:blipFill>
-          <a:blip r:embed="rId2">
+          <a:blip r:embed="rId3">
             <a:duotone>
               <a:prstClr val="black"/>
               <a:srgbClr val="0099FF">
@@ -6516,7 +7776,7 @@
           <p:nvPr/>
         </p:nvPicPr>
         <p:blipFill>
-          <a:blip r:embed="rId2">
+          <a:blip r:embed="rId3">
             <a:duotone>
               <a:prstClr val="black"/>
               <a:srgbClr val="0099FF">
@@ -6553,7 +7813,7 @@
           <p:nvPr/>
         </p:nvPicPr>
         <p:blipFill>
-          <a:blip r:embed="rId2">
+          <a:blip r:embed="rId3">
             <a:duotone>
               <a:prstClr val="black"/>
               <a:srgbClr val="0099FF">
@@ -6590,7 +7850,7 @@
           <p:nvPr/>
         </p:nvPicPr>
         <p:blipFill>
-          <a:blip r:embed="rId2">
+          <a:blip r:embed="rId3">
             <a:duotone>
               <a:prstClr val="black"/>
               <a:srgbClr val="0099FF">
@@ -6627,7 +7887,7 @@
           <p:nvPr/>
         </p:nvPicPr>
         <p:blipFill>
-          <a:blip r:embed="rId2">
+          <a:blip r:embed="rId3">
             <a:duotone>
               <a:prstClr val="black"/>
               <a:srgbClr val="0099FF">
@@ -6664,7 +7924,7 @@
           <p:nvPr/>
         </p:nvPicPr>
         <p:blipFill>
-          <a:blip r:embed="rId2">
+          <a:blip r:embed="rId3">
             <a:duotone>
               <a:prstClr val="black"/>
               <a:srgbClr val="0099FF">
@@ -6701,7 +7961,7 @@
           <p:nvPr/>
         </p:nvPicPr>
         <p:blipFill>
-          <a:blip r:embed="rId2">
+          <a:blip r:embed="rId3">
             <a:duotone>
               <a:prstClr val="black"/>
               <a:srgbClr val="0099FF">
@@ -6738,7 +7998,7 @@
           <p:nvPr/>
         </p:nvPicPr>
         <p:blipFill>
-          <a:blip r:embed="rId2">
+          <a:blip r:embed="rId3">
             <a:duotone>
               <a:prstClr val="black"/>
               <a:srgbClr val="FFFF00">
@@ -6775,7 +8035,7 @@
           <p:nvPr/>
         </p:nvPicPr>
         <p:blipFill>
-          <a:blip r:embed="rId2">
+          <a:blip r:embed="rId3">
             <a:duotone>
               <a:prstClr val="black"/>
               <a:srgbClr val="0099FF">
@@ -6812,7 +8072,7 @@
           <p:nvPr/>
         </p:nvPicPr>
         <p:blipFill>
-          <a:blip r:embed="rId2">
+          <a:blip r:embed="rId3">
             <a:duotone>
               <a:prstClr val="black"/>
               <a:srgbClr val="FFFF00">
@@ -6849,7 +8109,7 @@
           <p:nvPr/>
         </p:nvPicPr>
         <p:blipFill>
-          <a:blip r:embed="rId3" cstate="print">
+          <a:blip r:embed="rId4" cstate="print">
             <a:duotone>
               <a:prstClr val="black"/>
               <a:srgbClr val="0099FF">
@@ -6886,7 +8146,7 @@
           <p:nvPr/>
         </p:nvPicPr>
         <p:blipFill>
-          <a:blip r:embed="rId3" cstate="print">
+          <a:blip r:embed="rId4" cstate="print">
             <a:duotone>
               <a:prstClr val="black"/>
               <a:srgbClr val="0099FF">
@@ -7086,7 +8346,7 @@
           <p:nvPr/>
         </p:nvPicPr>
         <p:blipFill>
-          <a:blip r:embed="rId2" cstate="print">
+          <a:blip r:embed="rId3" cstate="print">
             <a:duotone>
               <a:prstClr val="black"/>
               <a:srgbClr val="FF99CC">
@@ -7134,7 +8394,7 @@
           <p:nvPr/>
         </p:nvPicPr>
         <p:blipFill>
-          <a:blip r:embed="rId3" cstate="print">
+          <a:blip r:embed="rId4" cstate="print">
             <a:duotone>
               <a:prstClr val="black"/>
               <a:srgbClr val="FF99CC">
@@ -7182,7 +8442,7 @@
           <p:nvPr/>
         </p:nvPicPr>
         <p:blipFill>
-          <a:blip r:embed="rId3" cstate="print">
+          <a:blip r:embed="rId4" cstate="print">
             <a:duotone>
               <a:prstClr val="black"/>
               <a:srgbClr val="FF99CC">
@@ -7230,7 +8490,7 @@
           <p:nvPr/>
         </p:nvPicPr>
         <p:blipFill>
-          <a:blip r:embed="rId3" cstate="print">
+          <a:blip r:embed="rId4" cstate="print">
             <a:duotone>
               <a:prstClr val="black"/>
               <a:srgbClr val="FF99CC">
@@ -7278,7 +8538,7 @@
           <p:nvPr/>
         </p:nvPicPr>
         <p:blipFill>
-          <a:blip r:embed="rId2" cstate="print">
+          <a:blip r:embed="rId3" cstate="print">
             <a:duotone>
               <a:prstClr val="black"/>
               <a:srgbClr val="FF99CC">
@@ -7326,7 +8586,7 @@
           <p:nvPr/>
         </p:nvPicPr>
         <p:blipFill>
-          <a:blip r:embed="rId2" cstate="print">
+          <a:blip r:embed="rId3" cstate="print">
             <a:duotone>
               <a:prstClr val="black"/>
               <a:srgbClr val="FF99CC">
@@ -7374,7 +8634,7 @@
           <p:nvPr/>
         </p:nvPicPr>
         <p:blipFill>
-          <a:blip r:embed="rId2" cstate="print">
+          <a:blip r:embed="rId3" cstate="print">
             <a:duotone>
               <a:prstClr val="black"/>
               <a:srgbClr val="FF99CC">
@@ -7422,7 +8682,7 @@
           <p:nvPr/>
         </p:nvPicPr>
         <p:blipFill>
-          <a:blip r:embed="rId2" cstate="print">
+          <a:blip r:embed="rId3" cstate="print">
             <a:duotone>
               <a:prstClr val="black"/>
               <a:srgbClr val="FF99CC">
@@ -7470,7 +8730,7 @@
           <p:nvPr/>
         </p:nvPicPr>
         <p:blipFill>
-          <a:blip r:embed="rId2" cstate="print">
+          <a:blip r:embed="rId3" cstate="print">
             <a:duotone>
               <a:prstClr val="black"/>
               <a:srgbClr val="00FF00">
@@ -7518,7 +8778,7 @@
           <p:nvPr/>
         </p:nvPicPr>
         <p:blipFill>
-          <a:blip r:embed="rId2" cstate="print">
+          <a:blip r:embed="rId3" cstate="print">
             <a:duotone>
               <a:prstClr val="black"/>
               <a:srgbClr val="00FF00">
@@ -7566,7 +8826,7 @@
           <p:nvPr/>
         </p:nvPicPr>
         <p:blipFill>
-          <a:blip r:embed="rId2" cstate="print">
+          <a:blip r:embed="rId3" cstate="print">
             <a:duotone>
               <a:prstClr val="black"/>
               <a:srgbClr val="00FF00">
@@ -7614,7 +8874,7 @@
           <p:nvPr/>
         </p:nvPicPr>
         <p:blipFill>
-          <a:blip r:embed="rId2" cstate="print">
+          <a:blip r:embed="rId3" cstate="print">
             <a:duotone>
               <a:prstClr val="black"/>
               <a:srgbClr val="FF99CC">
@@ -7662,7 +8922,7 @@
           <p:nvPr/>
         </p:nvPicPr>
         <p:blipFill>
-          <a:blip r:embed="rId2" cstate="print">
+          <a:blip r:embed="rId3" cstate="print">
             <a:duotone>
               <a:prstClr val="black"/>
               <a:srgbClr val="FF99CC">
@@ -7745,7 +9005,7 @@
           <p:nvPr/>
         </p:nvPicPr>
         <p:blipFill>
-          <a:blip r:embed="rId2" cstate="print">
+          <a:blip r:embed="rId3" cstate="print">
             <a:duotone>
               <a:prstClr val="black"/>
               <a:srgbClr val="00FF00">
@@ -7799,7 +9059,7 @@
           <p:nvPr/>
         </p:nvPicPr>
         <p:blipFill>
-          <a:blip r:embed="rId2" cstate="print">
+          <a:blip r:embed="rId3" cstate="print">
             <a:duotone>
               <a:prstClr val="black"/>
               <a:srgbClr val="00FF00">
@@ -7853,7 +9113,7 @@
           <p:nvPr/>
         </p:nvPicPr>
         <p:blipFill>
-          <a:blip r:embed="rId3" cstate="print">
+          <a:blip r:embed="rId4" cstate="print">
             <a:duotone>
               <a:prstClr val="black"/>
               <a:srgbClr val="FF99CC">
@@ -7907,7 +9167,7 @@
           <p:nvPr/>
         </p:nvPicPr>
         <p:blipFill>
-          <a:blip r:embed="rId3" cstate="print">
+          <a:blip r:embed="rId4" cstate="print">
             <a:duotone>
               <a:prstClr val="black"/>
               <a:srgbClr val="FF99CC">
@@ -7961,7 +9221,7 @@
           <p:nvPr/>
         </p:nvPicPr>
         <p:blipFill>
-          <a:blip r:embed="rId3" cstate="print">
+          <a:blip r:embed="rId4" cstate="print">
             <a:duotone>
               <a:prstClr val="black"/>
               <a:srgbClr val="FF99CC">
@@ -8143,7 +9403,7 @@
           <p:nvPr/>
         </p:nvPicPr>
         <p:blipFill>
-          <a:blip r:embed="rId2">
+          <a:blip r:embed="rId3">
             <a:duotone>
               <a:prstClr val="black"/>
               <a:srgbClr val="00FF00">
@@ -8180,7 +9440,7 @@
           <p:nvPr/>
         </p:nvPicPr>
         <p:blipFill>
-          <a:blip r:embed="rId2">
+          <a:blip r:embed="rId3">
             <a:duotone>
               <a:prstClr val="black"/>
               <a:schemeClr val="accent4">
@@ -8217,7 +9477,7 @@
           <p:nvPr/>
         </p:nvPicPr>
         <p:blipFill>
-          <a:blip r:embed="rId2">
+          <a:blip r:embed="rId3">
             <a:duotone>
               <a:prstClr val="black"/>
               <a:schemeClr val="accent4">
@@ -8254,7 +9514,7 @@
           <p:nvPr/>
         </p:nvPicPr>
         <p:blipFill>
-          <a:blip r:embed="rId2">
+          <a:blip r:embed="rId3">
             <a:duotone>
               <a:prstClr val="black"/>
               <a:schemeClr val="accent4">
@@ -8291,7 +9551,7 @@
           <p:nvPr/>
         </p:nvPicPr>
         <p:blipFill>
-          <a:blip r:embed="rId2">
+          <a:blip r:embed="rId3">
             <a:duotone>
               <a:prstClr val="black"/>
               <a:schemeClr val="accent4">
@@ -8328,7 +9588,7 @@
           <p:nvPr/>
         </p:nvPicPr>
         <p:blipFill>
-          <a:blip r:embed="rId2">
+          <a:blip r:embed="rId3">
             <a:duotone>
               <a:prstClr val="black"/>
               <a:srgbClr val="00FF00">
@@ -8365,7 +9625,7 @@
           <p:nvPr/>
         </p:nvPicPr>
         <p:blipFill>
-          <a:blip r:embed="rId2">
+          <a:blip r:embed="rId3">
             <a:duotone>
               <a:prstClr val="black"/>
               <a:schemeClr val="accent4">
@@ -8402,7 +9662,7 @@
           <p:nvPr/>
         </p:nvPicPr>
         <p:blipFill>
-          <a:blip r:embed="rId2">
+          <a:blip r:embed="rId3">
             <a:duotone>
               <a:prstClr val="black"/>
               <a:schemeClr val="accent4">
@@ -8439,7 +9699,7 @@
           <p:nvPr/>
         </p:nvPicPr>
         <p:blipFill>
-          <a:blip r:embed="rId2">
+          <a:blip r:embed="rId3">
             <a:duotone>
               <a:prstClr val="black"/>
               <a:srgbClr val="00FF00">
@@ -8476,7 +9736,7 @@
           <p:nvPr/>
         </p:nvPicPr>
         <p:blipFill>
-          <a:blip r:embed="rId3" cstate="print">
+          <a:blip r:embed="rId4" cstate="print">
             <a:duotone>
               <a:prstClr val="black"/>
               <a:schemeClr val="accent4">
@@ -8513,7 +9773,7 @@
           <p:nvPr/>
         </p:nvPicPr>
         <p:blipFill>
-          <a:blip r:embed="rId3" cstate="print">
+          <a:blip r:embed="rId4" cstate="print">
             <a:duotone>
               <a:prstClr val="black"/>
               <a:schemeClr val="accent4">
@@ -8550,7 +9810,7 @@
           <p:nvPr/>
         </p:nvPicPr>
         <p:blipFill>
-          <a:blip r:embed="rId3" cstate="print">
+          <a:blip r:embed="rId4" cstate="print">
             <a:duotone>
               <a:prstClr val="black"/>
               <a:schemeClr val="accent4">
@@ -8622,7 +9882,7 @@
           <p:nvPr/>
         </p:nvPicPr>
         <p:blipFill>
-          <a:blip r:embed="rId3" cstate="print">
+          <a:blip r:embed="rId4" cstate="print">
             <a:duotone>
               <a:prstClr val="black"/>
               <a:schemeClr val="accent4">
@@ -8665,7 +9925,7 @@
           <p:nvPr/>
         </p:nvPicPr>
         <p:blipFill>
-          <a:blip r:embed="rId3" cstate="print">
+          <a:blip r:embed="rId4" cstate="print">
             <a:duotone>
               <a:prstClr val="black"/>
               <a:schemeClr val="accent4">
@@ -8708,7 +9968,7 @@
           <p:nvPr/>
         </p:nvPicPr>
         <p:blipFill>
-          <a:blip r:embed="rId3" cstate="print">
+          <a:blip r:embed="rId4" cstate="print">
             <a:duotone>
               <a:prstClr val="black"/>
               <a:schemeClr val="accent4">
@@ -8751,7 +10011,7 @@
           <p:nvPr/>
         </p:nvPicPr>
         <p:blipFill>
-          <a:blip r:embed="rId2">
+          <a:blip r:embed="rId3">
             <a:duotone>
               <a:prstClr val="black"/>
               <a:srgbClr val="00FF00">
@@ -8794,7 +10054,7 @@
           <p:nvPr/>
         </p:nvPicPr>
         <p:blipFill>
-          <a:blip r:embed="rId2">
+          <a:blip r:embed="rId3">
             <a:duotone>
               <a:prstClr val="black"/>
               <a:srgbClr val="00FF00">
@@ -8837,7 +10097,7 @@
           <p:nvPr/>
         </p:nvPicPr>
         <p:blipFill>
-          <a:blip r:embed="rId2">
+          <a:blip r:embed="rId3">
             <a:duotone>
               <a:prstClr val="black"/>
               <a:srgbClr val="00FF00">
@@ -9008,7 +10268,7 @@
           <p:nvPr/>
         </p:nvPicPr>
         <p:blipFill>
-          <a:blip r:embed="rId2" cstate="print">
+          <a:blip r:embed="rId3" cstate="print">
             <a:duotone>
               <a:prstClr val="black"/>
               <a:srgbClr val="FFFF00">
@@ -9045,7 +10305,7 @@
           <p:nvPr/>
         </p:nvPicPr>
         <p:blipFill>
-          <a:blip r:embed="rId2" cstate="print">
+          <a:blip r:embed="rId3" cstate="print">
             <a:duotone>
               <a:prstClr val="black"/>
               <a:srgbClr val="FFFF00">
@@ -9082,7 +10342,7 @@
           <p:nvPr/>
         </p:nvPicPr>
         <p:blipFill>
-          <a:blip r:embed="rId2" cstate="print">
+          <a:blip r:embed="rId3" cstate="print">
             <a:duotone>
               <a:prstClr val="black"/>
               <a:srgbClr val="FFFF00">
@@ -9119,7 +10379,7 @@
           <p:nvPr/>
         </p:nvPicPr>
         <p:blipFill>
-          <a:blip r:embed="rId2" cstate="print">
+          <a:blip r:embed="rId3" cstate="print">
             <a:duotone>
               <a:prstClr val="black"/>
               <a:srgbClr val="FFFF00">
@@ -9156,7 +10416,7 @@
           <p:nvPr/>
         </p:nvPicPr>
         <p:blipFill>
-          <a:blip r:embed="rId2" cstate="print">
+          <a:blip r:embed="rId3" cstate="print">
             <a:duotone>
               <a:prstClr val="black"/>
               <a:srgbClr val="FFFF00">
@@ -9193,7 +10453,7 @@
           <p:nvPr/>
         </p:nvPicPr>
         <p:blipFill>
-          <a:blip r:embed="rId2" cstate="print">
+          <a:blip r:embed="rId3" cstate="print">
             <a:duotone>
               <a:prstClr val="black"/>
               <a:srgbClr val="FFFF00">
@@ -9230,7 +10490,7 @@
           <p:nvPr/>
         </p:nvPicPr>
         <p:blipFill>
-          <a:blip r:embed="rId2" cstate="print">
+          <a:blip r:embed="rId3" cstate="print">
             <a:duotone>
               <a:prstClr val="black"/>
               <a:srgbClr val="FF99CC">
@@ -9267,7 +10527,7 @@
           <p:nvPr/>
         </p:nvPicPr>
         <p:blipFill>
-          <a:blip r:embed="rId2" cstate="print">
+          <a:blip r:embed="rId3" cstate="print">
             <a:duotone>
               <a:prstClr val="black"/>
               <a:srgbClr val="FFFF00">
@@ -9304,7 +10564,7 @@
           <p:nvPr/>
         </p:nvPicPr>
         <p:blipFill>
-          <a:blip r:embed="rId2" cstate="print">
+          <a:blip r:embed="rId3" cstate="print">
             <a:duotone>
               <a:prstClr val="black"/>
               <a:srgbClr val="FFFF00">
@@ -9341,7 +10601,7 @@
           <p:nvPr/>
         </p:nvPicPr>
         <p:blipFill>
-          <a:blip r:embed="rId2" cstate="print">
+          <a:blip r:embed="rId3" cstate="print">
             <a:duotone>
               <a:prstClr val="black"/>
               <a:srgbClr val="FF99CC">
@@ -9378,7 +10638,7 @@
           <p:nvPr/>
         </p:nvPicPr>
         <p:blipFill>
-          <a:blip r:embed="rId3" cstate="print">
+          <a:blip r:embed="rId4" cstate="print">
             <a:duotone>
               <a:prstClr val="black"/>
               <a:srgbClr val="FFFF00">
@@ -9426,7 +10686,7 @@
           <p:nvPr/>
         </p:nvPicPr>
         <p:blipFill>
-          <a:blip r:embed="rId3" cstate="print">
+          <a:blip r:embed="rId4" cstate="print">
             <a:duotone>
               <a:prstClr val="black"/>
               <a:srgbClr val="FFFF00">
@@ -9509,7 +10769,7 @@
           <p:nvPr/>
         </p:nvPicPr>
         <p:blipFill>
-          <a:blip r:embed="rId2" cstate="print">
+          <a:blip r:embed="rId3" cstate="print">
             <a:duotone>
               <a:prstClr val="black"/>
               <a:srgbClr val="FF99CC">
@@ -9552,7 +10812,7 @@
           <p:nvPr/>
         </p:nvPicPr>
         <p:blipFill>
-          <a:blip r:embed="rId2" cstate="print">
+          <a:blip r:embed="rId3" cstate="print">
             <a:duotone>
               <a:prstClr val="black"/>
               <a:srgbClr val="FF99CC">
@@ -9595,7 +10855,7 @@
           <p:nvPr/>
         </p:nvPicPr>
         <p:blipFill>
-          <a:blip r:embed="rId2" cstate="print">
+          <a:blip r:embed="rId3" cstate="print">
             <a:duotone>
               <a:prstClr val="black"/>
               <a:srgbClr val="FF99CC">
@@ -9638,7 +10898,7 @@
           <p:nvPr/>
         </p:nvPicPr>
         <p:blipFill>
-          <a:blip r:embed="rId3" cstate="print">
+          <a:blip r:embed="rId4" cstate="print">
             <a:duotone>
               <a:prstClr val="black"/>
               <a:srgbClr val="FFFF00">
@@ -9692,7 +10952,7 @@
           <p:nvPr/>
         </p:nvPicPr>
         <p:blipFill>
-          <a:blip r:embed="rId3" cstate="print">
+          <a:blip r:embed="rId4" cstate="print">
             <a:duotone>
               <a:prstClr val="black"/>
               <a:srgbClr val="FFFF00">
@@ -9746,7 +11006,7 @@
           <p:nvPr/>
         </p:nvPicPr>
         <p:blipFill>
-          <a:blip r:embed="rId3" cstate="print">
+          <a:blip r:embed="rId4" cstate="print">
             <a:duotone>
               <a:prstClr val="black"/>
               <a:srgbClr val="FFFF00">
@@ -9928,7 +11188,7 @@
           <p:nvPr/>
         </p:nvPicPr>
         <p:blipFill>
-          <a:blip r:embed="rId2">
+          <a:blip r:embed="rId3">
             <a:duotone>
               <a:prstClr val="black"/>
               <a:srgbClr val="0099FF">
@@ -9965,7 +11225,7 @@
           <p:nvPr/>
         </p:nvPicPr>
         <p:blipFill>
-          <a:blip r:embed="rId2">
+          <a:blip r:embed="rId3">
             <a:duotone>
               <a:prstClr val="black"/>
               <a:srgbClr val="00FF00">
@@ -10002,7 +11262,7 @@
           <p:nvPr/>
         </p:nvPicPr>
         <p:blipFill>
-          <a:blip r:embed="rId2">
+          <a:blip r:embed="rId3">
             <a:duotone>
               <a:prstClr val="black"/>
               <a:srgbClr val="0099FF">
@@ -10039,7 +11299,7 @@
           <p:nvPr/>
         </p:nvPicPr>
         <p:blipFill>
-          <a:blip r:embed="rId2">
+          <a:blip r:embed="rId3">
             <a:duotone>
               <a:prstClr val="black"/>
               <a:srgbClr val="00FF00">
@@ -10076,7 +11336,7 @@
           <p:nvPr/>
         </p:nvPicPr>
         <p:blipFill>
-          <a:blip r:embed="rId2">
+          <a:blip r:embed="rId3">
             <a:duotone>
               <a:prstClr val="black"/>
               <a:srgbClr val="0099FF">
@@ -10113,7 +11373,7 @@
           <p:nvPr/>
         </p:nvPicPr>
         <p:blipFill>
-          <a:blip r:embed="rId2">
+          <a:blip r:embed="rId3">
             <a:duotone>
               <a:prstClr val="black"/>
               <a:srgbClr val="0099FF">
@@ -10150,7 +11410,7 @@
           <p:nvPr/>
         </p:nvPicPr>
         <p:blipFill>
-          <a:blip r:embed="rId2">
+          <a:blip r:embed="rId3">
             <a:duotone>
               <a:prstClr val="black"/>
               <a:srgbClr val="0099FF">
@@ -10187,7 +11447,7 @@
           <p:nvPr/>
         </p:nvPicPr>
         <p:blipFill>
-          <a:blip r:embed="rId2">
+          <a:blip r:embed="rId3">
             <a:duotone>
               <a:prstClr val="black"/>
               <a:srgbClr val="0099FF">
@@ -10224,7 +11484,7 @@
           <p:nvPr/>
         </p:nvPicPr>
         <p:blipFill>
-          <a:blip r:embed="rId3">
+          <a:blip r:embed="rId4">
             <a:duotone>
               <a:prstClr val="black"/>
               <a:srgbClr val="0099FF">
@@ -10261,7 +11521,7 @@
           <p:nvPr/>
         </p:nvPicPr>
         <p:blipFill>
-          <a:blip r:embed="rId3">
+          <a:blip r:embed="rId4">
             <a:duotone>
               <a:prstClr val="black"/>
               <a:srgbClr val="0099FF">
@@ -10333,7 +11593,7 @@
           <p:nvPr/>
         </p:nvPicPr>
         <p:blipFill>
-          <a:blip r:embed="rId3">
+          <a:blip r:embed="rId4">
             <a:duotone>
               <a:prstClr val="black"/>
               <a:srgbClr val="0099FF">
@@ -10376,7 +11636,7 @@
           <p:nvPr/>
         </p:nvPicPr>
         <p:blipFill>
-          <a:blip r:embed="rId3">
+          <a:blip r:embed="rId4">
             <a:duotone>
               <a:prstClr val="black"/>
               <a:srgbClr val="0099FF">
@@ -10419,7 +11679,7 @@
           <p:nvPr/>
         </p:nvPicPr>
         <p:blipFill>
-          <a:blip r:embed="rId3">
+          <a:blip r:embed="rId4">
             <a:duotone>
               <a:prstClr val="black"/>
               <a:srgbClr val="0099FF">
@@ -10462,7 +11722,7 @@
           <p:nvPr/>
         </p:nvPicPr>
         <p:blipFill>
-          <a:blip r:embed="rId3">
+          <a:blip r:embed="rId4">
             <a:duotone>
               <a:prstClr val="black"/>
               <a:srgbClr val="0099FF">
@@ -10505,7 +11765,7 @@
           <p:nvPr/>
         </p:nvPicPr>
         <p:blipFill>
-          <a:blip r:embed="rId2">
+          <a:blip r:embed="rId3">
             <a:duotone>
               <a:prstClr val="black"/>
               <a:srgbClr val="00FF00">
@@ -10548,7 +11808,7 @@
           <p:nvPr/>
         </p:nvPicPr>
         <p:blipFill>
-          <a:blip r:embed="rId2">
+          <a:blip r:embed="rId3">
             <a:duotone>
               <a:prstClr val="black"/>
               <a:srgbClr val="00FF00">
@@ -10591,7 +11851,7 @@
           <p:nvPr/>
         </p:nvPicPr>
         <p:blipFill>
-          <a:blip r:embed="rId2">
+          <a:blip r:embed="rId3">
             <a:duotone>
               <a:prstClr val="black"/>
               <a:srgbClr val="00FF00">
@@ -10634,7 +11894,7 @@
           <p:nvPr/>
         </p:nvPicPr>
         <p:blipFill>
-          <a:blip r:embed="rId2">
+          <a:blip r:embed="rId3">
             <a:duotone>
               <a:prstClr val="black"/>
               <a:srgbClr val="00FF00">
@@ -10805,7 +12065,7 @@
           <p:nvPr/>
         </p:nvPicPr>
         <p:blipFill>
-          <a:blip r:embed="rId2" cstate="print">
+          <a:blip r:embed="rId3" cstate="print">
             <a:duotone>
               <a:prstClr val="black"/>
               <a:srgbClr val="FF99CC">
@@ -10842,7 +12102,7 @@
           <p:nvPr/>
         </p:nvPicPr>
         <p:blipFill>
-          <a:blip r:embed="rId2" cstate="print">
+          <a:blip r:embed="rId3" cstate="print">
             <a:duotone>
               <a:prstClr val="black"/>
               <a:srgbClr val="FF99CC">
@@ -10879,7 +12139,7 @@
           <p:nvPr/>
         </p:nvPicPr>
         <p:blipFill>
-          <a:blip r:embed="rId2" cstate="print">
+          <a:blip r:embed="rId3" cstate="print">
             <a:duotone>
               <a:prstClr val="black"/>
               <a:srgbClr val="FF99CC">
@@ -10916,7 +12176,7 @@
           <p:nvPr/>
         </p:nvPicPr>
         <p:blipFill>
-          <a:blip r:embed="rId3" cstate="print">
+          <a:blip r:embed="rId4" cstate="print">
             <a:duotone>
               <a:prstClr val="black"/>
               <a:srgbClr val="FF99CC">
@@ -10953,7 +12213,7 @@
           <p:nvPr/>
         </p:nvPicPr>
         <p:blipFill>
-          <a:blip r:embed="rId3" cstate="print">
+          <a:blip r:embed="rId4" cstate="print">
             <a:duotone>
               <a:prstClr val="black"/>
               <a:srgbClr val="0099FF">
@@ -10990,7 +12250,7 @@
           <p:nvPr/>
         </p:nvPicPr>
         <p:blipFill>
-          <a:blip r:embed="rId3" cstate="print">
+          <a:blip r:embed="rId4" cstate="print">
             <a:duotone>
               <a:prstClr val="black"/>
               <a:srgbClr val="0099FF">
@@ -11027,7 +12287,7 @@
           <p:nvPr/>
         </p:nvPicPr>
         <p:blipFill>
-          <a:blip r:embed="rId3" cstate="print">
+          <a:blip r:embed="rId4" cstate="print">
             <a:duotone>
               <a:prstClr val="black"/>
               <a:srgbClr val="FF99CC">
@@ -11064,7 +12324,7 @@
           <p:nvPr/>
         </p:nvPicPr>
         <p:blipFill>
-          <a:blip r:embed="rId3" cstate="print">
+          <a:blip r:embed="rId4" cstate="print">
             <a:duotone>
               <a:prstClr val="black"/>
               <a:srgbClr val="0099FF">
@@ -11101,7 +12361,7 @@
           <p:nvPr/>
         </p:nvPicPr>
         <p:blipFill>
-          <a:blip r:embed="rId3" cstate="print">
+          <a:blip r:embed="rId4" cstate="print">
             <a:duotone>
               <a:prstClr val="black"/>
               <a:srgbClr val="FF99CC">
@@ -11138,7 +12398,7 @@
           <p:nvPr/>
         </p:nvPicPr>
         <p:blipFill>
-          <a:blip r:embed="rId3" cstate="print">
+          <a:blip r:embed="rId4" cstate="print">
             <a:duotone>
               <a:prstClr val="black"/>
               <a:srgbClr val="FF99CC">
@@ -11175,7 +12435,7 @@
           <p:nvPr/>
         </p:nvPicPr>
         <p:blipFill>
-          <a:blip r:embed="rId3" cstate="print">
+          <a:blip r:embed="rId4" cstate="print">
             <a:duotone>
               <a:prstClr val="black"/>
               <a:srgbClr val="FF99CC">
@@ -11212,7 +12472,7 @@
           <p:nvPr/>
         </p:nvPicPr>
         <p:blipFill>
-          <a:blip r:embed="rId3" cstate="print">
+          <a:blip r:embed="rId4" cstate="print">
             <a:duotone>
               <a:prstClr val="black"/>
               <a:srgbClr val="FF99CC">
@@ -11284,7 +12544,7 @@
           <p:nvPr/>
         </p:nvPicPr>
         <p:blipFill>
-          <a:blip r:embed="rId3" cstate="print">
+          <a:blip r:embed="rId4" cstate="print">
             <a:duotone>
               <a:prstClr val="black"/>
               <a:srgbClr val="0099FF">
@@ -11327,7 +12587,7 @@
           <p:nvPr/>
         </p:nvPicPr>
         <p:blipFill>
-          <a:blip r:embed="rId3" cstate="print">
+          <a:blip r:embed="rId4" cstate="print">
             <a:duotone>
               <a:prstClr val="black"/>
               <a:srgbClr val="0099FF">
@@ -11370,7 +12630,7 @@
           <p:nvPr/>
         </p:nvPicPr>
         <p:blipFill>
-          <a:blip r:embed="rId3" cstate="print">
+          <a:blip r:embed="rId4" cstate="print">
             <a:duotone>
               <a:prstClr val="black"/>
               <a:srgbClr val="0099FF">
@@ -11413,7 +12673,7 @@
           <p:nvPr/>
         </p:nvPicPr>
         <p:blipFill>
-          <a:blip r:embed="rId2" cstate="print">
+          <a:blip r:embed="rId3" cstate="print">
             <a:duotone>
               <a:prstClr val="black"/>
               <a:srgbClr val="FF99CC">
@@ -11456,7 +12716,7 @@
           <p:nvPr/>
         </p:nvPicPr>
         <p:blipFill>
-          <a:blip r:embed="rId2" cstate="print">
+          <a:blip r:embed="rId3" cstate="print">
             <a:duotone>
               <a:prstClr val="black"/>
               <a:srgbClr val="FF99CC">
@@ -11499,7 +12759,7 @@
           <p:nvPr/>
         </p:nvPicPr>
         <p:blipFill>
-          <a:blip r:embed="rId2" cstate="print">
+          <a:blip r:embed="rId3" cstate="print">
             <a:duotone>
               <a:prstClr val="black"/>
               <a:srgbClr val="FF99CC">
@@ -11670,7 +12930,7 @@
           <p:nvPr/>
         </p:nvPicPr>
         <p:blipFill>
-          <a:blip r:embed="rId2">
+          <a:blip r:embed="rId3">
             <a:duotone>
               <a:prstClr val="black"/>
               <a:srgbClr val="0099FF">
@@ -11707,7 +12967,7 @@
           <p:nvPr/>
         </p:nvPicPr>
         <p:blipFill>
-          <a:blip r:embed="rId2">
+          <a:blip r:embed="rId3">
             <a:duotone>
               <a:prstClr val="black"/>
               <a:srgbClr val="0099FF">
@@ -11744,7 +13004,7 @@
           <p:nvPr/>
         </p:nvPicPr>
         <p:blipFill>
-          <a:blip r:embed="rId2">
+          <a:blip r:embed="rId3">
             <a:duotone>
               <a:prstClr val="black"/>
               <a:srgbClr val="0099FF">
@@ -11781,7 +13041,7 @@
           <p:nvPr/>
         </p:nvPicPr>
         <p:blipFill>
-          <a:blip r:embed="rId2">
+          <a:blip r:embed="rId3">
             <a:duotone>
               <a:prstClr val="black"/>
               <a:srgbClr val="0099FF">
@@ -11818,7 +13078,7 @@
           <p:nvPr/>
         </p:nvPicPr>
         <p:blipFill>
-          <a:blip r:embed="rId2">
+          <a:blip r:embed="rId3">
             <a:duotone>
               <a:prstClr val="black"/>
               <a:srgbClr val="0099FF">
@@ -11855,7 +13115,7 @@
           <p:nvPr/>
         </p:nvPicPr>
         <p:blipFill>
-          <a:blip r:embed="rId2">
+          <a:blip r:embed="rId3">
             <a:duotone>
               <a:prstClr val="black"/>
               <a:srgbClr val="0099FF">
@@ -11892,7 +13152,7 @@
           <p:nvPr/>
         </p:nvPicPr>
         <p:blipFill>
-          <a:blip r:embed="rId2">
+          <a:blip r:embed="rId3">
             <a:duotone>
               <a:prstClr val="black"/>
               <a:srgbClr val="0099FF">
@@ -11929,7 +13189,7 @@
           <p:nvPr/>
         </p:nvPicPr>
         <p:blipFill>
-          <a:blip r:embed="rId2">
+          <a:blip r:embed="rId3">
             <a:duotone>
               <a:prstClr val="black"/>
               <a:srgbClr val="FFFF00">
@@ -11966,7 +13226,7 @@
           <p:nvPr/>
         </p:nvPicPr>
         <p:blipFill>
-          <a:blip r:embed="rId2">
+          <a:blip r:embed="rId3">
             <a:duotone>
               <a:prstClr val="black"/>
               <a:srgbClr val="FFFF00">
@@ -12003,7 +13263,7 @@
           <p:nvPr/>
         </p:nvPicPr>
         <p:blipFill>
-          <a:blip r:embed="rId3" cstate="print">
+          <a:blip r:embed="rId4" cstate="print">
             <a:duotone>
               <a:prstClr val="black"/>
               <a:srgbClr val="0099FF">
@@ -12040,7 +13300,7 @@
           <p:nvPr/>
         </p:nvPicPr>
         <p:blipFill>
-          <a:blip r:embed="rId3" cstate="print">
+          <a:blip r:embed="rId4" cstate="print">
             <a:duotone>
               <a:prstClr val="black"/>
               <a:srgbClr val="0099FF">
@@ -12112,7 +13372,7 @@
           <p:nvPr/>
         </p:nvPicPr>
         <p:blipFill>
-          <a:blip r:embed="rId3" cstate="print">
+          <a:blip r:embed="rId4" cstate="print">
             <a:duotone>
               <a:prstClr val="black"/>
               <a:srgbClr val="0099FF">
@@ -12155,7 +13415,7 @@
           <p:nvPr/>
         </p:nvPicPr>
         <p:blipFill>
-          <a:blip r:embed="rId3" cstate="print">
+          <a:blip r:embed="rId4" cstate="print">
             <a:duotone>
               <a:prstClr val="black"/>
               <a:srgbClr val="0099FF">
@@ -12198,7 +13458,7 @@
           <p:nvPr/>
         </p:nvPicPr>
         <p:blipFill>
-          <a:blip r:embed="rId3" cstate="print">
+          <a:blip r:embed="rId4" cstate="print">
             <a:duotone>
               <a:prstClr val="black"/>
               <a:srgbClr val="0099FF">
@@ -12241,7 +13501,7 @@
           <p:nvPr/>
         </p:nvPicPr>
         <p:blipFill>
-          <a:blip r:embed="rId2">
+          <a:blip r:embed="rId3">
             <a:duotone>
               <a:prstClr val="black"/>
               <a:srgbClr val="FFFF00">
@@ -12284,7 +13544,7 @@
           <p:nvPr/>
         </p:nvPicPr>
         <p:blipFill>
-          <a:blip r:embed="rId2">
+          <a:blip r:embed="rId3">
             <a:duotone>
               <a:prstClr val="black"/>
               <a:srgbClr val="FFFF00">
@@ -12327,7 +13587,7 @@
           <p:nvPr/>
         </p:nvPicPr>
         <p:blipFill>
-          <a:blip r:embed="rId2">
+          <a:blip r:embed="rId3">
             <a:duotone>
               <a:prstClr val="black"/>
               <a:srgbClr val="FFFF00">
@@ -12370,7 +13630,7 @@
           <p:nvPr/>
         </p:nvPicPr>
         <p:blipFill>
-          <a:blip r:embed="rId2">
+          <a:blip r:embed="rId3">
             <a:duotone>
               <a:prstClr val="black"/>
               <a:srgbClr val="FFFF00">
@@ -12570,7 +13830,7 @@
           <p:nvPr/>
         </p:nvPicPr>
         <p:blipFill>
-          <a:blip r:embed="rId2" cstate="print">
+          <a:blip r:embed="rId3" cstate="print">
             <a:duotone>
               <a:prstClr val="black"/>
               <a:srgbClr val="00FF00">
@@ -12607,7 +13867,7 @@
           <p:nvPr/>
         </p:nvPicPr>
         <p:blipFill>
-          <a:blip r:embed="rId3">
+          <a:blip r:embed="rId4">
             <a:duotone>
               <a:prstClr val="black"/>
               <a:srgbClr val="0099FF">
@@ -12644,7 +13904,7 @@
           <p:nvPr/>
         </p:nvPicPr>
         <p:blipFill>
-          <a:blip r:embed="rId2" cstate="print">
+          <a:blip r:embed="rId3" cstate="print">
             <a:duotone>
               <a:prstClr val="black"/>
               <a:srgbClr val="0099FF">
@@ -12681,7 +13941,7 @@
           <p:nvPr/>
         </p:nvPicPr>
         <p:blipFill>
-          <a:blip r:embed="rId2" cstate="print">
+          <a:blip r:embed="rId3" cstate="print">
             <a:duotone>
               <a:prstClr val="black"/>
               <a:srgbClr val="00FF00">
@@ -12718,7 +13978,7 @@
           <p:nvPr/>
         </p:nvPicPr>
         <p:blipFill>
-          <a:blip r:embed="rId2" cstate="print">
+          <a:blip r:embed="rId3" cstate="print">
             <a:duotone>
               <a:prstClr val="black"/>
               <a:srgbClr val="00FF00">
@@ -12755,7 +14015,7 @@
           <p:nvPr/>
         </p:nvPicPr>
         <p:blipFill>
-          <a:blip r:embed="rId2" cstate="print">
+          <a:blip r:embed="rId3" cstate="print">
             <a:duotone>
               <a:prstClr val="black"/>
               <a:srgbClr val="0099FF">
@@ -12792,7 +14052,7 @@
           <p:nvPr/>
         </p:nvPicPr>
         <p:blipFill>
-          <a:blip r:embed="rId2" cstate="print">
+          <a:blip r:embed="rId3" cstate="print">
             <a:duotone>
               <a:prstClr val="black"/>
               <a:srgbClr val="00FF00">
@@ -12829,7 +14089,7 @@
           <p:nvPr/>
         </p:nvPicPr>
         <p:blipFill>
-          <a:blip r:embed="rId2" cstate="print">
+          <a:blip r:embed="rId3" cstate="print">
             <a:duotone>
               <a:prstClr val="black"/>
               <a:srgbClr val="00FF00">
@@ -12866,7 +14126,7 @@
           <p:nvPr/>
         </p:nvPicPr>
         <p:blipFill>
-          <a:blip r:embed="rId2" cstate="print">
+          <a:blip r:embed="rId3" cstate="print">
             <a:duotone>
               <a:prstClr val="black"/>
               <a:srgbClr val="0099FF">
@@ -12903,7 +14163,7 @@
           <p:nvPr/>
         </p:nvPicPr>
         <p:blipFill>
-          <a:blip r:embed="rId2" cstate="print">
+          <a:blip r:embed="rId3" cstate="print">
             <a:duotone>
               <a:prstClr val="black"/>
               <a:srgbClr val="00FF00">
@@ -12940,7 +14200,7 @@
           <p:nvPr/>
         </p:nvPicPr>
         <p:blipFill>
-          <a:blip r:embed="rId3">
+          <a:blip r:embed="rId4">
             <a:duotone>
               <a:prstClr val="black"/>
               <a:srgbClr val="0099FF">
@@ -12977,7 +14237,7 @@
           <p:nvPr/>
         </p:nvPicPr>
         <p:blipFill>
-          <a:blip r:embed="rId3">
+          <a:blip r:embed="rId4">
             <a:duotone>
               <a:prstClr val="black"/>
               <a:srgbClr val="0099FF">
@@ -13014,7 +14274,7 @@
           <p:nvPr/>
         </p:nvPicPr>
         <p:blipFill>
-          <a:blip r:embed="rId3">
+          <a:blip r:embed="rId4">
             <a:duotone>
               <a:prstClr val="black"/>
               <a:srgbClr val="0099FF">
@@ -13051,7 +14311,7 @@
           <p:nvPr/>
         </p:nvPicPr>
         <p:blipFill>
-          <a:blip r:embed="rId3">
+          <a:blip r:embed="rId4">
             <a:duotone>
               <a:prstClr val="black"/>
               <a:srgbClr val="0099FF">
@@ -13088,7 +14348,7 @@
           <p:nvPr/>
         </p:nvPicPr>
         <p:blipFill>
-          <a:blip r:embed="rId3">
+          <a:blip r:embed="rId4">
             <a:duotone>
               <a:prstClr val="black"/>
               <a:srgbClr val="0099FF">
@@ -13125,7 +14385,7 @@
           <p:nvPr/>
         </p:nvPicPr>
         <p:blipFill>
-          <a:blip r:embed="rId2" cstate="print">
+          <a:blip r:embed="rId3" cstate="print">
             <a:duotone>
               <a:prstClr val="black"/>
               <a:srgbClr val="0099FF">
@@ -13162,7 +14422,7 @@
           <p:nvPr/>
         </p:nvPicPr>
         <p:blipFill>
-          <a:blip r:embed="rId2" cstate="print">
+          <a:blip r:embed="rId3" cstate="print">
             <a:duotone>
               <a:prstClr val="black"/>
               <a:srgbClr val="0099FF">
@@ -13199,7 +14459,7 @@
           <p:nvPr/>
         </p:nvPicPr>
         <p:blipFill>
-          <a:blip r:embed="rId2" cstate="print">
+          <a:blip r:embed="rId3" cstate="print">
             <a:duotone>
               <a:prstClr val="black"/>
               <a:srgbClr val="0099FF">
@@ -39569,7 +40829,7 @@
           <p:nvPr/>
         </p:nvPicPr>
         <p:blipFill>
-          <a:blip r:embed="rId2" cstate="print">
+          <a:blip r:embed="rId3" cstate="print">
             <a:duotone>
               <a:prstClr val="black"/>
               <a:srgbClr val="FFFF00">
@@ -39606,7 +40866,7 @@
           <p:nvPr/>
         </p:nvPicPr>
         <p:blipFill>
-          <a:blip r:embed="rId2" cstate="print">
+          <a:blip r:embed="rId3" cstate="print">
             <a:duotone>
               <a:prstClr val="black"/>
               <a:srgbClr val="FFFF00">
@@ -39643,7 +40903,7 @@
           <p:nvPr/>
         </p:nvPicPr>
         <p:blipFill>
-          <a:blip r:embed="rId2" cstate="print">
+          <a:blip r:embed="rId3" cstate="print">
             <a:duotone>
               <a:prstClr val="black"/>
               <a:srgbClr val="00FF00">
@@ -39680,7 +40940,7 @@
           <p:nvPr/>
         </p:nvPicPr>
         <p:blipFill>
-          <a:blip r:embed="rId2" cstate="print">
+          <a:blip r:embed="rId3" cstate="print">
             <a:duotone>
               <a:prstClr val="black"/>
               <a:srgbClr val="00FF00">
@@ -39717,7 +40977,7 @@
           <p:nvPr/>
         </p:nvPicPr>
         <p:blipFill>
-          <a:blip r:embed="rId3" cstate="print">
+          <a:blip r:embed="rId4" cstate="print">
             <a:duotone>
               <a:prstClr val="black"/>
               <a:srgbClr val="00FF00">
@@ -39789,7 +41049,7 @@
           <p:nvPr/>
         </p:nvPicPr>
         <p:blipFill>
-          <a:blip r:embed="rId2" cstate="print">
+          <a:blip r:embed="rId3" cstate="print">
             <a:duotone>
               <a:prstClr val="black"/>
               <a:srgbClr val="00FF00">
@@ -39832,7 +41092,7 @@
           <p:nvPr/>
         </p:nvPicPr>
         <p:blipFill>
-          <a:blip r:embed="rId3" cstate="print">
+          <a:blip r:embed="rId4" cstate="print">
             <a:duotone>
               <a:prstClr val="black"/>
               <a:srgbClr val="FFFF6B">
@@ -39875,7 +41135,7 @@
           <p:nvPr/>
         </p:nvPicPr>
         <p:blipFill>
-          <a:blip r:embed="rId2" cstate="print">
+          <a:blip r:embed="rId3" cstate="print">
             <a:duotone>
               <a:prstClr val="black"/>
               <a:srgbClr val="00FF00">
@@ -39918,7 +41178,7 @@
           <p:nvPr/>
         </p:nvPicPr>
         <p:blipFill>
-          <a:blip r:embed="rId2" cstate="print">
+          <a:blip r:embed="rId3" cstate="print">
             <a:duotone>
               <a:prstClr val="black"/>
               <a:srgbClr val="00FF00">
@@ -39961,7 +41221,7 @@
           <p:nvPr/>
         </p:nvPicPr>
         <p:blipFill>
-          <a:blip r:embed="rId2" cstate="print">
+          <a:blip r:embed="rId3" cstate="print">
             <a:duotone>
               <a:prstClr val="black"/>
               <a:srgbClr val="00FF00">
@@ -40004,7 +41264,7 @@
           <p:nvPr/>
         </p:nvPicPr>
         <p:blipFill>
-          <a:blip r:embed="rId2" cstate="print">
+          <a:blip r:embed="rId3" cstate="print">
             <a:duotone>
               <a:prstClr val="black"/>
               <a:srgbClr val="00FF00">
@@ -40047,7 +41307,7 @@
           <p:nvPr/>
         </p:nvPicPr>
         <p:blipFill>
-          <a:blip r:embed="rId3" cstate="print">
+          <a:blip r:embed="rId4" cstate="print">
             <a:duotone>
               <a:prstClr val="black"/>
               <a:srgbClr val="00FF00">
@@ -40090,7 +41350,7 @@
           <p:nvPr/>
         </p:nvPicPr>
         <p:blipFill>
-          <a:blip r:embed="rId2" cstate="print">
+          <a:blip r:embed="rId3" cstate="print">
             <a:duotone>
               <a:prstClr val="black"/>
               <a:srgbClr val="00FF00">
@@ -40133,7 +41393,7 @@
           <p:nvPr/>
         </p:nvPicPr>
         <p:blipFill>
-          <a:blip r:embed="rId3" cstate="print">
+          <a:blip r:embed="rId4" cstate="print">
             <a:duotone>
               <a:prstClr val="black"/>
               <a:srgbClr val="FFFF6B">
@@ -40176,7 +41436,7 @@
           <p:nvPr/>
         </p:nvPicPr>
         <p:blipFill>
-          <a:blip r:embed="rId2" cstate="print">
+          <a:blip r:embed="rId3" cstate="print">
             <a:duotone>
               <a:prstClr val="black"/>
               <a:srgbClr val="00FF00">
@@ -40219,7 +41479,7 @@
           <p:nvPr/>
         </p:nvPicPr>
         <p:blipFill>
-          <a:blip r:embed="rId2" cstate="print">
+          <a:blip r:embed="rId3" cstate="print">
             <a:duotone>
               <a:prstClr val="black"/>
               <a:srgbClr val="00FF00">
@@ -40262,7 +41522,7 @@
           <p:nvPr/>
         </p:nvPicPr>
         <p:blipFill>
-          <a:blip r:embed="rId2" cstate="print">
+          <a:blip r:embed="rId3" cstate="print">
             <a:duotone>
               <a:prstClr val="black"/>
               <a:srgbClr val="00FF00">
@@ -40305,7 +41565,7 @@
           <p:nvPr/>
         </p:nvPicPr>
         <p:blipFill>
-          <a:blip r:embed="rId3" cstate="print">
+          <a:blip r:embed="rId4" cstate="print">
             <a:duotone>
               <a:prstClr val="black"/>
               <a:srgbClr val="FFFF6B">
@@ -41016,7 +42276,7 @@
           <p:nvPr/>
         </p:nvPicPr>
         <p:blipFill>
-          <a:blip r:embed="rId2">
+          <a:blip r:embed="rId3">
             <a:duotone>
               <a:prstClr val="black"/>
               <a:srgbClr val="FF99CC">
@@ -41053,7 +42313,7 @@
           <p:nvPr/>
         </p:nvPicPr>
         <p:blipFill>
-          <a:blip r:embed="rId2">
+          <a:blip r:embed="rId3">
             <a:duotone>
               <a:prstClr val="black"/>
               <a:srgbClr val="FF99CC">
@@ -41090,7 +42350,7 @@
           <p:nvPr/>
         </p:nvPicPr>
         <p:blipFill>
-          <a:blip r:embed="rId2">
+          <a:blip r:embed="rId3">
             <a:duotone>
               <a:prstClr val="black"/>
               <a:srgbClr val="FF99CC">
@@ -41127,7 +42387,7 @@
           <p:nvPr/>
         </p:nvPicPr>
         <p:blipFill>
-          <a:blip r:embed="rId3">
+          <a:blip r:embed="rId4">
             <a:duotone>
               <a:prstClr val="black"/>
               <a:srgbClr val="FFFF00">
@@ -41164,7 +42424,7 @@
           <p:nvPr/>
         </p:nvPicPr>
         <p:blipFill>
-          <a:blip r:embed="rId3">
+          <a:blip r:embed="rId4">
             <a:duotone>
               <a:prstClr val="black"/>
               <a:srgbClr val="FFFF00">
@@ -41236,7 +42496,7 @@
           <p:nvPr/>
         </p:nvPicPr>
         <p:blipFill>
-          <a:blip r:embed="rId2">
+          <a:blip r:embed="rId3">
             <a:duotone>
               <a:prstClr val="black"/>
               <a:srgbClr val="FF99CC">
@@ -41279,7 +42539,7 @@
           <p:nvPr/>
         </p:nvPicPr>
         <p:blipFill>
-          <a:blip r:embed="rId2">
+          <a:blip r:embed="rId3">
             <a:duotone>
               <a:prstClr val="black"/>
               <a:srgbClr val="FF99CC">
@@ -41322,7 +42582,7 @@
           <p:nvPr/>
         </p:nvPicPr>
         <p:blipFill>
-          <a:blip r:embed="rId2">
+          <a:blip r:embed="rId3">
             <a:duotone>
               <a:prstClr val="black"/>
               <a:srgbClr val="FF99CC">
@@ -41365,7 +42625,7 @@
           <p:nvPr/>
         </p:nvPicPr>
         <p:blipFill>
-          <a:blip r:embed="rId2">
+          <a:blip r:embed="rId3">
             <a:duotone>
               <a:prstClr val="black"/>
               <a:srgbClr val="FF99CC">
@@ -41408,7 +42668,7 @@
           <p:nvPr/>
         </p:nvPicPr>
         <p:blipFill>
-          <a:blip r:embed="rId2">
+          <a:blip r:embed="rId3">
             <a:duotone>
               <a:prstClr val="black"/>
               <a:srgbClr val="FF99CC">
@@ -41451,7 +42711,7 @@
           <p:nvPr/>
         </p:nvPicPr>
         <p:blipFill>
-          <a:blip r:embed="rId2">
+          <a:blip r:embed="rId3">
             <a:duotone>
               <a:prstClr val="black"/>
               <a:srgbClr val="FF99CC">
@@ -41494,7 +42754,7 @@
           <p:nvPr/>
         </p:nvPicPr>
         <p:blipFill>
-          <a:blip r:embed="rId3">
+          <a:blip r:embed="rId4">
             <a:duotone>
               <a:prstClr val="black"/>
               <a:srgbClr val="FFFF00">
@@ -41537,7 +42797,7 @@
           <p:nvPr/>
         </p:nvPicPr>
         <p:blipFill>
-          <a:blip r:embed="rId2">
+          <a:blip r:embed="rId3">
             <a:duotone>
               <a:prstClr val="black"/>
               <a:srgbClr val="FF99CC">
@@ -41580,7 +42840,7 @@
           <p:nvPr/>
         </p:nvPicPr>
         <p:blipFill>
-          <a:blip r:embed="rId2">
+          <a:blip r:embed="rId3">
             <a:duotone>
               <a:prstClr val="black"/>
               <a:srgbClr val="FF99CC">
@@ -41623,7 +42883,7 @@
           <p:nvPr/>
         </p:nvPicPr>
         <p:blipFill>
-          <a:blip r:embed="rId2">
+          <a:blip r:embed="rId3">
             <a:duotone>
               <a:prstClr val="black"/>
               <a:srgbClr val="FF99CC">
@@ -41666,7 +42926,7 @@
           <p:nvPr/>
         </p:nvPicPr>
         <p:blipFill>
-          <a:blip r:embed="rId3">
+          <a:blip r:embed="rId4">
             <a:duotone>
               <a:prstClr val="black"/>
               <a:srgbClr val="FFFF00">
@@ -41709,7 +42969,7 @@
           <p:nvPr/>
         </p:nvPicPr>
         <p:blipFill>
-          <a:blip r:embed="rId3">
+          <a:blip r:embed="rId4">
             <a:duotone>
               <a:prstClr val="black"/>
               <a:srgbClr val="FFA0E4">
@@ -41752,7 +43012,7 @@
           <p:nvPr/>
         </p:nvPicPr>
         <p:blipFill>
-          <a:blip r:embed="rId2">
+          <a:blip r:embed="rId3">
             <a:duotone>
               <a:prstClr val="black"/>
               <a:schemeClr val="accent4">
@@ -41923,7 +43183,7 @@
           <p:nvPr/>
         </p:nvPicPr>
         <p:blipFill>
-          <a:blip r:embed="rId2" cstate="print">
+          <a:blip r:embed="rId3" cstate="print">
             <a:duotone>
               <a:prstClr val="black"/>
               <a:srgbClr val="FF99CC">
@@ -41971,7 +43231,7 @@
           <p:nvPr/>
         </p:nvPicPr>
         <p:blipFill>
-          <a:blip r:embed="rId3" cstate="print">
+          <a:blip r:embed="rId4" cstate="print">
             <a:duotone>
               <a:prstClr val="black"/>
               <a:srgbClr val="FF99CC">
@@ -42019,7 +43279,7 @@
           <p:nvPr/>
         </p:nvPicPr>
         <p:blipFill>
-          <a:blip r:embed="rId3" cstate="print">
+          <a:blip r:embed="rId4" cstate="print">
             <a:duotone>
               <a:prstClr val="black"/>
               <a:srgbClr val="FF99CC">
@@ -42067,7 +43327,7 @@
           <p:nvPr/>
         </p:nvPicPr>
         <p:blipFill>
-          <a:blip r:embed="rId3" cstate="print">
+          <a:blip r:embed="rId4" cstate="print">
             <a:duotone>
               <a:prstClr val="black"/>
               <a:srgbClr val="FF99CC">
@@ -42115,7 +43375,7 @@
           <p:nvPr/>
         </p:nvPicPr>
         <p:blipFill>
-          <a:blip r:embed="rId2" cstate="print">
+          <a:blip r:embed="rId3" cstate="print">
             <a:duotone>
               <a:prstClr val="black"/>
               <a:srgbClr val="FF99CC">
@@ -42163,7 +43423,7 @@
           <p:nvPr/>
         </p:nvPicPr>
         <p:blipFill>
-          <a:blip r:embed="rId2" cstate="print">
+          <a:blip r:embed="rId3" cstate="print">
             <a:duotone>
               <a:prstClr val="black"/>
               <a:srgbClr val="FF99CC">
@@ -42240,7 +43500,7 @@
           <p:nvPr/>
         </p:nvPicPr>
         <p:blipFill>
-          <a:blip r:embed="rId2" cstate="print">
+          <a:blip r:embed="rId3" cstate="print">
             <a:duotone>
               <a:prstClr val="black"/>
               <a:srgbClr val="FF99CC">
@@ -42288,7 +43548,7 @@
           <p:nvPr/>
         </p:nvPicPr>
         <p:blipFill>
-          <a:blip r:embed="rId2" cstate="print">
+          <a:blip r:embed="rId3" cstate="print">
             <a:duotone>
               <a:prstClr val="black"/>
               <a:srgbClr val="FF99CC">
@@ -42336,7 +43596,7 @@
           <p:nvPr/>
         </p:nvPicPr>
         <p:blipFill>
-          <a:blip r:embed="rId2" cstate="print">
+          <a:blip r:embed="rId3" cstate="print">
             <a:duotone>
               <a:prstClr val="black"/>
               <a:srgbClr val="FF99CC">
@@ -42384,7 +43644,7 @@
           <p:nvPr/>
         </p:nvPicPr>
         <p:blipFill>
-          <a:blip r:embed="rId2" cstate="print">
+          <a:blip r:embed="rId3" cstate="print">
             <a:duotone>
               <a:prstClr val="black"/>
               <a:srgbClr val="FF99CC">
@@ -42432,7 +43692,7 @@
           <p:nvPr/>
         </p:nvPicPr>
         <p:blipFill>
-          <a:blip r:embed="rId2" cstate="print">
+          <a:blip r:embed="rId3" cstate="print">
             <a:duotone>
               <a:prstClr val="black"/>
               <a:srgbClr val="FF99CC">
@@ -42480,7 +43740,7 @@
           <p:nvPr/>
         </p:nvPicPr>
         <p:blipFill>
-          <a:blip r:embed="rId2" cstate="print">
+          <a:blip r:embed="rId3" cstate="print">
             <a:duotone>
               <a:prstClr val="black"/>
               <a:srgbClr val="00FF00">
@@ -42528,7 +43788,7 @@
           <p:nvPr/>
         </p:nvPicPr>
         <p:blipFill>
-          <a:blip r:embed="rId2" cstate="print">
+          <a:blip r:embed="rId3" cstate="print">
             <a:duotone>
               <a:prstClr val="black"/>
               <a:srgbClr val="00FF00">
@@ -42576,7 +43836,7 @@
           <p:nvPr/>
         </p:nvPicPr>
         <p:blipFill>
-          <a:blip r:embed="rId2" cstate="print">
+          <a:blip r:embed="rId3" cstate="print">
             <a:duotone>
               <a:prstClr val="black"/>
               <a:srgbClr val="FF99CC">
@@ -42624,7 +43884,7 @@
           <p:nvPr/>
         </p:nvPicPr>
         <p:blipFill>
-          <a:blip r:embed="rId2" cstate="print">
+          <a:blip r:embed="rId3" cstate="print">
             <a:duotone>
               <a:prstClr val="black"/>
               <a:srgbClr val="00FF00">
@@ -42672,7 +43932,7 @@
           <p:nvPr/>
         </p:nvPicPr>
         <p:blipFill>
-          <a:blip r:embed="rId2" cstate="print">
+          <a:blip r:embed="rId3" cstate="print">
             <a:duotone>
               <a:prstClr val="black"/>
               <a:srgbClr val="FF99CC">
@@ -42720,7 +43980,7 @@
           <p:nvPr/>
         </p:nvPicPr>
         <p:blipFill>
-          <a:blip r:embed="rId2" cstate="print">
+          <a:blip r:embed="rId3" cstate="print">
             <a:duotone>
               <a:prstClr val="black"/>
               <a:srgbClr val="FF99CC">
@@ -42768,7 +44028,7 @@
           <p:nvPr/>
         </p:nvPicPr>
         <p:blipFill>
-          <a:blip r:embed="rId2" cstate="print">
+          <a:blip r:embed="rId3" cstate="print">
             <a:duotone>
               <a:prstClr val="black"/>
               <a:srgbClr val="FF99CC">
@@ -43008,7 +44268,7 @@
           <p:nvPr/>
         </p:nvPicPr>
         <p:blipFill>
-          <a:blip r:embed="rId2">
+          <a:blip r:embed="rId3">
             <a:duotone>
               <a:prstClr val="black"/>
               <a:srgbClr val="00FF00">
@@ -43045,7 +44305,7 @@
           <p:nvPr/>
         </p:nvPicPr>
         <p:blipFill>
-          <a:blip r:embed="rId2">
+          <a:blip r:embed="rId3">
             <a:duotone>
               <a:prstClr val="black"/>
               <a:schemeClr val="accent4">
@@ -43082,7 +44342,7 @@
           <p:nvPr/>
         </p:nvPicPr>
         <p:blipFill>
-          <a:blip r:embed="rId2">
+          <a:blip r:embed="rId3">
             <a:duotone>
               <a:prstClr val="black"/>
               <a:schemeClr val="accent4">
@@ -43119,7 +44379,7 @@
           <p:nvPr/>
         </p:nvPicPr>
         <p:blipFill>
-          <a:blip r:embed="rId2">
+          <a:blip r:embed="rId3">
             <a:duotone>
               <a:prstClr val="black"/>
               <a:schemeClr val="accent4">
@@ -43156,7 +44416,7 @@
           <p:nvPr/>
         </p:nvPicPr>
         <p:blipFill>
-          <a:blip r:embed="rId2">
+          <a:blip r:embed="rId3">
             <a:duotone>
               <a:prstClr val="black"/>
               <a:schemeClr val="accent4">
@@ -43193,7 +44453,7 @@
           <p:nvPr/>
         </p:nvPicPr>
         <p:blipFill>
-          <a:blip r:embed="rId2">
+          <a:blip r:embed="rId3">
             <a:duotone>
               <a:prstClr val="black"/>
               <a:schemeClr val="accent4">
@@ -43230,7 +44490,7 @@
           <p:nvPr/>
         </p:nvPicPr>
         <p:blipFill>
-          <a:blip r:embed="rId2">
+          <a:blip r:embed="rId3">
             <a:duotone>
               <a:prstClr val="black"/>
               <a:schemeClr val="accent4">
@@ -43267,7 +44527,7 @@
           <p:nvPr/>
         </p:nvPicPr>
         <p:blipFill>
-          <a:blip r:embed="rId2">
+          <a:blip r:embed="rId3">
             <a:duotone>
               <a:prstClr val="black"/>
               <a:schemeClr val="accent4">
@@ -43304,7 +44564,7 @@
           <p:nvPr/>
         </p:nvPicPr>
         <p:blipFill>
-          <a:blip r:embed="rId2">
+          <a:blip r:embed="rId3">
             <a:duotone>
               <a:prstClr val="black"/>
               <a:schemeClr val="accent4">
@@ -43341,7 +44601,7 @@
           <p:nvPr/>
         </p:nvPicPr>
         <p:blipFill>
-          <a:blip r:embed="rId2">
+          <a:blip r:embed="rId3">
             <a:duotone>
               <a:prstClr val="black"/>
               <a:schemeClr val="accent4">
@@ -43378,7 +44638,7 @@
           <p:nvPr/>
         </p:nvPicPr>
         <p:blipFill>
-          <a:blip r:embed="rId2">
+          <a:blip r:embed="rId3">
             <a:duotone>
               <a:prstClr val="black"/>
               <a:srgbClr val="00FF00">
@@ -43415,7 +44675,7 @@
           <p:nvPr/>
         </p:nvPicPr>
         <p:blipFill>
-          <a:blip r:embed="rId2">
+          <a:blip r:embed="rId3">
             <a:duotone>
               <a:prstClr val="black"/>
               <a:schemeClr val="accent4">
@@ -43452,7 +44712,7 @@
           <p:nvPr/>
         </p:nvPicPr>
         <p:blipFill>
-          <a:blip r:embed="rId2">
+          <a:blip r:embed="rId3">
             <a:duotone>
               <a:prstClr val="black"/>
               <a:schemeClr val="accent4">
@@ -43489,7 +44749,7 @@
           <p:nvPr/>
         </p:nvPicPr>
         <p:blipFill>
-          <a:blip r:embed="rId2">
+          <a:blip r:embed="rId3">
             <a:duotone>
               <a:prstClr val="black"/>
               <a:schemeClr val="accent4">
@@ -43526,7 +44786,7 @@
           <p:nvPr/>
         </p:nvPicPr>
         <p:blipFill>
-          <a:blip r:embed="rId2">
+          <a:blip r:embed="rId3">
             <a:duotone>
               <a:prstClr val="black"/>
               <a:srgbClr val="00FF00">
@@ -43563,7 +44823,7 @@
           <p:nvPr/>
         </p:nvPicPr>
         <p:blipFill>
-          <a:blip r:embed="rId3" cstate="print">
+          <a:blip r:embed="rId4" cstate="print">
             <a:duotone>
               <a:prstClr val="black"/>
               <a:schemeClr val="accent4">
@@ -43600,7 +44860,7 @@
           <p:nvPr/>
         </p:nvPicPr>
         <p:blipFill>
-          <a:blip r:embed="rId3" cstate="print">
+          <a:blip r:embed="rId4" cstate="print">
             <a:duotone>
               <a:prstClr val="black"/>
               <a:schemeClr val="accent4">
@@ -43637,7 +44897,7 @@
           <p:nvPr/>
         </p:nvPicPr>
         <p:blipFill>
-          <a:blip r:embed="rId3" cstate="print">
+          <a:blip r:embed="rId4" cstate="print">
             <a:duotone>
               <a:prstClr val="black"/>
               <a:schemeClr val="accent4">
@@ -43866,7 +45126,7 @@
           <p:nvPr/>
         </p:nvPicPr>
         <p:blipFill>
-          <a:blip r:embed="rId2" cstate="print">
+          <a:blip r:embed="rId3" cstate="print">
             <a:duotone>
               <a:prstClr val="black"/>
               <a:srgbClr val="FFFF00">
@@ -43903,7 +45163,7 @@
           <p:nvPr/>
         </p:nvPicPr>
         <p:blipFill>
-          <a:blip r:embed="rId2" cstate="print">
+          <a:blip r:embed="rId3" cstate="print">
             <a:duotone>
               <a:prstClr val="black"/>
               <a:srgbClr val="FFFF00">
@@ -43940,7 +45200,7 @@
           <p:nvPr/>
         </p:nvPicPr>
         <p:blipFill>
-          <a:blip r:embed="rId2" cstate="print">
+          <a:blip r:embed="rId3" cstate="print">
             <a:duotone>
               <a:prstClr val="black"/>
               <a:srgbClr val="FFFF00">
@@ -43977,7 +45237,7 @@
           <p:nvPr/>
         </p:nvPicPr>
         <p:blipFill>
-          <a:blip r:embed="rId2" cstate="print">
+          <a:blip r:embed="rId3" cstate="print">
             <a:duotone>
               <a:prstClr val="black"/>
               <a:srgbClr val="FFFF00">
@@ -44014,7 +45274,7 @@
           <p:nvPr/>
         </p:nvPicPr>
         <p:blipFill>
-          <a:blip r:embed="rId2" cstate="print">
+          <a:blip r:embed="rId3" cstate="print">
             <a:duotone>
               <a:prstClr val="black"/>
               <a:srgbClr val="FFFF00">
@@ -44051,7 +45311,7 @@
           <p:nvPr/>
         </p:nvPicPr>
         <p:blipFill>
-          <a:blip r:embed="rId2" cstate="print">
+          <a:blip r:embed="rId3" cstate="print">
             <a:duotone>
               <a:prstClr val="black"/>
               <a:srgbClr val="FFFF00">
@@ -44088,7 +45348,7 @@
           <p:nvPr/>
         </p:nvPicPr>
         <p:blipFill>
-          <a:blip r:embed="rId2" cstate="print">
+          <a:blip r:embed="rId3" cstate="print">
             <a:duotone>
               <a:prstClr val="black"/>
               <a:srgbClr val="FFFF00">
@@ -44125,7 +45385,7 @@
           <p:nvPr/>
         </p:nvPicPr>
         <p:blipFill>
-          <a:blip r:embed="rId2" cstate="print">
+          <a:blip r:embed="rId3" cstate="print">
             <a:duotone>
               <a:prstClr val="black"/>
               <a:srgbClr val="FFFF00">
@@ -44162,7 +45422,7 @@
           <p:nvPr/>
         </p:nvPicPr>
         <p:blipFill>
-          <a:blip r:embed="rId2" cstate="print">
+          <a:blip r:embed="rId3" cstate="print">
             <a:duotone>
               <a:prstClr val="black"/>
               <a:srgbClr val="FFFF00">
@@ -44199,7 +45459,7 @@
           <p:nvPr/>
         </p:nvPicPr>
         <p:blipFill>
-          <a:blip r:embed="rId2" cstate="print">
+          <a:blip r:embed="rId3" cstate="print">
             <a:duotone>
               <a:prstClr val="black"/>
               <a:srgbClr val="FF99CC">
@@ -44236,7 +45496,7 @@
           <p:nvPr/>
         </p:nvPicPr>
         <p:blipFill>
-          <a:blip r:embed="rId2" cstate="print">
+          <a:blip r:embed="rId3" cstate="print">
             <a:duotone>
               <a:prstClr val="black"/>
               <a:srgbClr val="FFFF00">
@@ -44273,7 +45533,7 @@
           <p:nvPr/>
         </p:nvPicPr>
         <p:blipFill>
-          <a:blip r:embed="rId2" cstate="print">
+          <a:blip r:embed="rId3" cstate="print">
             <a:duotone>
               <a:prstClr val="black"/>
               <a:srgbClr val="FFFF00">
@@ -44310,7 +45570,7 @@
           <p:nvPr/>
         </p:nvPicPr>
         <p:blipFill>
-          <a:blip r:embed="rId2" cstate="print">
+          <a:blip r:embed="rId3" cstate="print">
             <a:duotone>
               <a:prstClr val="black"/>
               <a:srgbClr val="FF99CC">
@@ -44347,7 +45607,7 @@
           <p:nvPr/>
         </p:nvPicPr>
         <p:blipFill>
-          <a:blip r:embed="rId2" cstate="print">
+          <a:blip r:embed="rId3" cstate="print">
             <a:duotone>
               <a:prstClr val="black"/>
               <a:srgbClr val="FFFF00">
@@ -44384,7 +45644,7 @@
           <p:nvPr/>
         </p:nvPicPr>
         <p:blipFill>
-          <a:blip r:embed="rId2" cstate="print">
+          <a:blip r:embed="rId3" cstate="print">
             <a:duotone>
               <a:prstClr val="black"/>
               <a:srgbClr val="FFFF00">
@@ -44421,7 +45681,7 @@
           <p:nvPr/>
         </p:nvPicPr>
         <p:blipFill>
-          <a:blip r:embed="rId2" cstate="print">
+          <a:blip r:embed="rId3" cstate="print">
             <a:duotone>
               <a:prstClr val="black"/>
               <a:srgbClr val="FFFF00">
@@ -44458,7 +45718,7 @@
           <p:nvPr/>
         </p:nvPicPr>
         <p:blipFill>
-          <a:blip r:embed="rId3" cstate="print">
+          <a:blip r:embed="rId4" cstate="print">
             <a:duotone>
               <a:prstClr val="black"/>
               <a:srgbClr val="FFFF00">
@@ -44506,7 +45766,7 @@
           <p:nvPr/>
         </p:nvPicPr>
         <p:blipFill>
-          <a:blip r:embed="rId3" cstate="print">
+          <a:blip r:embed="rId4" cstate="print">
             <a:duotone>
               <a:prstClr val="black"/>
               <a:srgbClr val="FFFF00">

</xml_diff>